<commit_message>
Revise project concepts slides.
</commit_message>
<xml_diff>
--- a/Project Concepts/PROJ216 Slides Day1.pptx
+++ b/Project Concepts/PROJ216 Slides Day1.pptx
@@ -304,7 +304,7 @@
               <a:pPr>
                 <a:defRPr/>
               </a:pPr>
-              <a:t>2/7/2019</a:t>
+              <a:t>2/11/2019</a:t>
             </a:fld>
             <a:endParaRPr lang="en-US"/>
           </a:p>
@@ -553,35 +553,35 @@
           <a:p>
             <a:pPr lvl="0"/>
             <a:r>
-              <a:rPr lang="en-US" noProof="0" smtClean="0"/>
+              <a:rPr lang="en-US" noProof="0"/>
               <a:t>Click to edit Master text styles</a:t>
             </a:r>
           </a:p>
           <a:p>
             <a:pPr lvl="1"/>
             <a:r>
-              <a:rPr lang="en-US" noProof="0" smtClean="0"/>
+              <a:rPr lang="en-US" noProof="0"/>
               <a:t>Second level</a:t>
             </a:r>
           </a:p>
           <a:p>
             <a:pPr lvl="2"/>
             <a:r>
-              <a:rPr lang="en-US" noProof="0" smtClean="0"/>
+              <a:rPr lang="en-US" noProof="0"/>
               <a:t>Third level</a:t>
             </a:r>
           </a:p>
           <a:p>
             <a:pPr lvl="3"/>
             <a:r>
-              <a:rPr lang="en-US" noProof="0" smtClean="0"/>
+              <a:rPr lang="en-US" noProof="0"/>
               <a:t>Fourth level</a:t>
             </a:r>
           </a:p>
           <a:p>
             <a:pPr lvl="4"/>
             <a:r>
-              <a:rPr lang="en-US" noProof="0" smtClean="0"/>
+              <a:rPr lang="en-US" noProof="0"/>
               <a:t>Fifth level</a:t>
             </a:r>
           </a:p>
@@ -633,7 +633,7 @@
               <a:pPr>
                 <a:defRPr/>
               </a:pPr>
-              <a:t>2/7/2019</a:t>
+              <a:t>2/11/2019</a:t>
             </a:fld>
             <a:endParaRPr lang="en-US"/>
           </a:p>
@@ -1019,7 +1019,7 @@
           </a:lstStyle>
           <a:p>
             <a:r>
-              <a:rPr lang="en-US" smtClean="0"/>
+              <a:rPr lang="en-US"/>
               <a:t>Click to edit Master subtitle style</a:t>
             </a:r>
             <a:endParaRPr lang="en-CA" dirty="0"/>
@@ -1089,7 +1089,7 @@
               <a:defRPr/>
             </a:pPr>
             <a:r>
-              <a:rPr lang="en-CA" sz="1400" i="1" dirty="0" smtClean="0">
+              <a:rPr lang="en-CA" sz="1400" i="1" dirty="0">
                 <a:solidFill>
                   <a:schemeClr val="accent2">
                     <a:lumMod val="50000"/>
@@ -1099,18 +1099,8 @@
               </a:rPr>
               <a:t>– Software Project Concepts –</a:t>
             </a:r>
-            <a:r>
-              <a:rPr lang="en-CA" sz="2800" i="1" dirty="0" smtClean="0">
-                <a:solidFill>
-                  <a:schemeClr val="accent2">
-                    <a:lumMod val="50000"/>
-                  </a:schemeClr>
-                </a:solidFill>
-              </a:rPr>
-              <a:t/>
-            </a:r>
             <a:br>
-              <a:rPr lang="en-CA" sz="2800" i="1" dirty="0" smtClean="0">
+              <a:rPr lang="en-CA" sz="2800" i="1" dirty="0">
                 <a:solidFill>
                   <a:schemeClr val="accent2">
                     <a:lumMod val="50000"/>
@@ -1119,7 +1109,7 @@
               </a:rPr>
             </a:br>
             <a:r>
-              <a:rPr lang="en-CA" sz="2000" dirty="0" smtClean="0">
+              <a:rPr lang="en-CA" sz="2000" dirty="0">
                 <a:solidFill>
                   <a:schemeClr val="accent2">
                     <a:lumMod val="50000"/>
@@ -1176,10 +1166,9 @@
           <a:lstStyle/>
           <a:p>
             <a:r>
-              <a:rPr lang="en-US" smtClean="0"/>
+              <a:rPr lang="en-US"/>
               <a:t>Click to edit Master title style</a:t>
             </a:r>
-            <a:endParaRPr lang="en-US"/>
           </a:p>
         </p:txBody>
       </p:sp>
@@ -1200,38 +1189,37 @@
           <a:p>
             <a:pPr lvl="0"/>
             <a:r>
-              <a:rPr lang="en-US" smtClean="0"/>
+              <a:rPr lang="en-US"/>
               <a:t>Click to edit Master text styles</a:t>
             </a:r>
           </a:p>
           <a:p>
             <a:pPr lvl="1"/>
             <a:r>
-              <a:rPr lang="en-US" smtClean="0"/>
+              <a:rPr lang="en-US"/>
               <a:t>Second level</a:t>
             </a:r>
           </a:p>
           <a:p>
             <a:pPr lvl="2"/>
             <a:r>
-              <a:rPr lang="en-US" smtClean="0"/>
+              <a:rPr lang="en-US"/>
               <a:t>Third level</a:t>
             </a:r>
           </a:p>
           <a:p>
             <a:pPr lvl="3"/>
             <a:r>
-              <a:rPr lang="en-US" smtClean="0"/>
+              <a:rPr lang="en-US"/>
               <a:t>Fourth level</a:t>
             </a:r>
           </a:p>
           <a:p>
             <a:pPr lvl="4"/>
             <a:r>
-              <a:rPr lang="en-US" smtClean="0"/>
+              <a:rPr lang="en-US"/>
               <a:t>Fifth level</a:t>
             </a:r>
-            <a:endParaRPr lang="en-US"/>
           </a:p>
         </p:txBody>
       </p:sp>
@@ -1281,10 +1269,9 @@
           <a:lstStyle/>
           <a:p>
             <a:r>
-              <a:rPr lang="en-US" smtClean="0"/>
+              <a:rPr lang="en-US"/>
               <a:t>Click to edit Master title style</a:t>
             </a:r>
-            <a:endParaRPr lang="en-US"/>
           </a:p>
         </p:txBody>
       </p:sp>
@@ -1310,38 +1297,37 @@
           <a:p>
             <a:pPr lvl="0"/>
             <a:r>
-              <a:rPr lang="en-US" smtClean="0"/>
+              <a:rPr lang="en-US"/>
               <a:t>Click to edit Master text styles</a:t>
             </a:r>
           </a:p>
           <a:p>
             <a:pPr lvl="1"/>
             <a:r>
-              <a:rPr lang="en-US" smtClean="0"/>
+              <a:rPr lang="en-US"/>
               <a:t>Second level</a:t>
             </a:r>
           </a:p>
           <a:p>
             <a:pPr lvl="2"/>
             <a:r>
-              <a:rPr lang="en-US" smtClean="0"/>
+              <a:rPr lang="en-US"/>
               <a:t>Third level</a:t>
             </a:r>
           </a:p>
           <a:p>
             <a:pPr lvl="3"/>
             <a:r>
-              <a:rPr lang="en-US" smtClean="0"/>
+              <a:rPr lang="en-US"/>
               <a:t>Fourth level</a:t>
             </a:r>
           </a:p>
           <a:p>
             <a:pPr lvl="4"/>
             <a:r>
-              <a:rPr lang="en-US" smtClean="0"/>
+              <a:rPr lang="en-US"/>
               <a:t>Fifth level</a:t>
             </a:r>
-            <a:endParaRPr lang="en-US"/>
           </a:p>
         </p:txBody>
       </p:sp>
@@ -1391,10 +1377,9 @@
           <a:lstStyle/>
           <a:p>
             <a:r>
-              <a:rPr lang="en-US" smtClean="0"/>
+              <a:rPr lang="en-US"/>
               <a:t>Click to edit Master title style</a:t>
             </a:r>
-            <a:endParaRPr lang="en-US"/>
           </a:p>
         </p:txBody>
       </p:sp>
@@ -1420,38 +1405,37 @@
           <a:p>
             <a:pPr lvl="0"/>
             <a:r>
-              <a:rPr lang="en-US" smtClean="0"/>
+              <a:rPr lang="en-US"/>
               <a:t>Click to edit Master text styles</a:t>
             </a:r>
           </a:p>
           <a:p>
             <a:pPr lvl="1"/>
             <a:r>
-              <a:rPr lang="en-US" smtClean="0"/>
+              <a:rPr lang="en-US"/>
               <a:t>Second level</a:t>
             </a:r>
           </a:p>
           <a:p>
             <a:pPr lvl="2"/>
             <a:r>
-              <a:rPr lang="en-US" smtClean="0"/>
+              <a:rPr lang="en-US"/>
               <a:t>Third level</a:t>
             </a:r>
           </a:p>
           <a:p>
             <a:pPr lvl="3"/>
             <a:r>
-              <a:rPr lang="en-US" smtClean="0"/>
+              <a:rPr lang="en-US"/>
               <a:t>Fourth level</a:t>
             </a:r>
           </a:p>
           <a:p>
             <a:pPr lvl="4"/>
             <a:r>
-              <a:rPr lang="en-US" smtClean="0"/>
+              <a:rPr lang="en-US"/>
               <a:t>Fifth level</a:t>
             </a:r>
-            <a:endParaRPr lang="en-US"/>
           </a:p>
         </p:txBody>
       </p:sp>
@@ -1477,38 +1461,37 @@
           <a:p>
             <a:pPr lvl="0"/>
             <a:r>
-              <a:rPr lang="en-US" smtClean="0"/>
+              <a:rPr lang="en-US"/>
               <a:t>Click to edit Master text styles</a:t>
             </a:r>
           </a:p>
           <a:p>
             <a:pPr lvl="1"/>
             <a:r>
-              <a:rPr lang="en-US" smtClean="0"/>
+              <a:rPr lang="en-US"/>
               <a:t>Second level</a:t>
             </a:r>
           </a:p>
           <a:p>
             <a:pPr lvl="2"/>
             <a:r>
-              <a:rPr lang="en-US" smtClean="0"/>
+              <a:rPr lang="en-US"/>
               <a:t>Third level</a:t>
             </a:r>
           </a:p>
           <a:p>
             <a:pPr lvl="3"/>
             <a:r>
-              <a:rPr lang="en-US" smtClean="0"/>
+              <a:rPr lang="en-US"/>
               <a:t>Fourth level</a:t>
             </a:r>
           </a:p>
           <a:p>
             <a:pPr lvl="4"/>
             <a:r>
-              <a:rPr lang="en-US" smtClean="0"/>
+              <a:rPr lang="en-US"/>
               <a:t>Fifth level</a:t>
             </a:r>
-            <a:endParaRPr lang="en-US"/>
           </a:p>
         </p:txBody>
       </p:sp>
@@ -1558,10 +1541,9 @@
           <a:lstStyle/>
           <a:p>
             <a:r>
-              <a:rPr lang="en-US" smtClean="0"/>
+              <a:rPr lang="en-US"/>
               <a:t>Click to edit Master title style</a:t>
             </a:r>
-            <a:endParaRPr lang="en-US"/>
           </a:p>
         </p:txBody>
       </p:sp>
@@ -1587,10 +1569,9 @@
           <a:p>
             <a:pPr lvl="0"/>
             <a:r>
-              <a:rPr lang="en-US" noProof="0" smtClean="0"/>
+              <a:rPr lang="en-US" noProof="0"/>
               <a:t>Click icon to add table</a:t>
             </a:r>
-            <a:endParaRPr lang="en-US" noProof="0"/>
           </a:p>
         </p:txBody>
       </p:sp>
@@ -1635,10 +1616,9 @@
           <a:lstStyle/>
           <a:p>
             <a:r>
-              <a:rPr lang="en-US" smtClean="0"/>
+              <a:rPr lang="en-US"/>
               <a:t>Click to edit Master title style</a:t>
             </a:r>
-            <a:endParaRPr lang="en-US"/>
           </a:p>
         </p:txBody>
       </p:sp>
@@ -1675,35 +1655,35 @@
           <a:p>
             <a:pPr lvl="0"/>
             <a:r>
-              <a:rPr lang="en-US" smtClean="0"/>
+              <a:rPr lang="en-US"/>
               <a:t>Click to edit Master text styles</a:t>
             </a:r>
           </a:p>
           <a:p>
             <a:pPr lvl="1"/>
             <a:r>
-              <a:rPr lang="en-US" smtClean="0"/>
+              <a:rPr lang="en-US"/>
               <a:t>Second level</a:t>
             </a:r>
           </a:p>
           <a:p>
             <a:pPr lvl="2"/>
             <a:r>
-              <a:rPr lang="en-US" smtClean="0"/>
+              <a:rPr lang="en-US"/>
               <a:t>Third level</a:t>
             </a:r>
           </a:p>
           <a:p>
             <a:pPr lvl="3"/>
             <a:r>
-              <a:rPr lang="en-US" smtClean="0"/>
+              <a:rPr lang="en-US"/>
               <a:t>Fourth level</a:t>
             </a:r>
           </a:p>
           <a:p>
             <a:pPr lvl="4"/>
             <a:r>
-              <a:rPr lang="en-US" smtClean="0"/>
+              <a:rPr lang="en-US"/>
               <a:t>Fifth level</a:t>
             </a:r>
             <a:endParaRPr lang="en-US" dirty="0"/>
@@ -1760,10 +1740,9 @@
           </a:lstStyle>
           <a:p>
             <a:r>
-              <a:rPr lang="en-US" smtClean="0"/>
+              <a:rPr lang="en-US"/>
               <a:t>Click to edit Master title style</a:t>
             </a:r>
-            <a:endParaRPr lang="en-US"/>
           </a:p>
         </p:txBody>
       </p:sp>
@@ -1826,7 +1805,7 @@
           <a:p>
             <a:pPr lvl="0"/>
             <a:r>
-              <a:rPr lang="en-US" smtClean="0"/>
+              <a:rPr lang="en-US"/>
               <a:t>Click to edit Master text styles</a:t>
             </a:r>
           </a:p>
@@ -1873,10 +1852,9 @@
           <a:lstStyle/>
           <a:p>
             <a:r>
-              <a:rPr lang="en-US" smtClean="0"/>
+              <a:rPr lang="en-US"/>
               <a:t>Click to edit Master title style</a:t>
             </a:r>
-            <a:endParaRPr lang="en-US"/>
           </a:p>
         </p:txBody>
       </p:sp>
@@ -1930,38 +1908,37 @@
           <a:p>
             <a:pPr lvl="0"/>
             <a:r>
-              <a:rPr lang="en-US" smtClean="0"/>
+              <a:rPr lang="en-US"/>
               <a:t>Click to edit Master text styles</a:t>
             </a:r>
           </a:p>
           <a:p>
             <a:pPr lvl="1"/>
             <a:r>
-              <a:rPr lang="en-US" smtClean="0"/>
+              <a:rPr lang="en-US"/>
               <a:t>Second level</a:t>
             </a:r>
           </a:p>
           <a:p>
             <a:pPr lvl="2"/>
             <a:r>
-              <a:rPr lang="en-US" smtClean="0"/>
+              <a:rPr lang="en-US"/>
               <a:t>Third level</a:t>
             </a:r>
           </a:p>
           <a:p>
             <a:pPr lvl="3"/>
             <a:r>
-              <a:rPr lang="en-US" smtClean="0"/>
+              <a:rPr lang="en-US"/>
               <a:t>Fourth level</a:t>
             </a:r>
           </a:p>
           <a:p>
             <a:pPr lvl="4"/>
             <a:r>
-              <a:rPr lang="en-US" smtClean="0"/>
+              <a:rPr lang="en-US"/>
               <a:t>Fifth level</a:t>
             </a:r>
-            <a:endParaRPr lang="en-US"/>
           </a:p>
         </p:txBody>
       </p:sp>
@@ -2015,38 +1992,37 @@
           <a:p>
             <a:pPr lvl="0"/>
             <a:r>
-              <a:rPr lang="en-US" smtClean="0"/>
+              <a:rPr lang="en-US"/>
               <a:t>Click to edit Master text styles</a:t>
             </a:r>
           </a:p>
           <a:p>
             <a:pPr lvl="1"/>
             <a:r>
-              <a:rPr lang="en-US" smtClean="0"/>
+              <a:rPr lang="en-US"/>
               <a:t>Second level</a:t>
             </a:r>
           </a:p>
           <a:p>
             <a:pPr lvl="2"/>
             <a:r>
-              <a:rPr lang="en-US" smtClean="0"/>
+              <a:rPr lang="en-US"/>
               <a:t>Third level</a:t>
             </a:r>
           </a:p>
           <a:p>
             <a:pPr lvl="3"/>
             <a:r>
-              <a:rPr lang="en-US" smtClean="0"/>
+              <a:rPr lang="en-US"/>
               <a:t>Fourth level</a:t>
             </a:r>
           </a:p>
           <a:p>
             <a:pPr lvl="4"/>
             <a:r>
-              <a:rPr lang="en-US" smtClean="0"/>
+              <a:rPr lang="en-US"/>
               <a:t>Fifth level</a:t>
             </a:r>
-            <a:endParaRPr lang="en-US"/>
           </a:p>
         </p:txBody>
       </p:sp>
@@ -2100,10 +2076,9 @@
           </a:lstStyle>
           <a:p>
             <a:r>
-              <a:rPr lang="en-US" smtClean="0"/>
+              <a:rPr lang="en-US"/>
               <a:t>Click to edit Master title style</a:t>
             </a:r>
-            <a:endParaRPr lang="en-US"/>
           </a:p>
         </p:txBody>
       </p:sp>
@@ -2166,7 +2141,7 @@
           <a:p>
             <a:pPr lvl="0"/>
             <a:r>
-              <a:rPr lang="en-US" smtClean="0"/>
+              <a:rPr lang="en-US"/>
               <a:t>Click to edit Master text styles</a:t>
             </a:r>
           </a:p>
@@ -2222,35 +2197,35 @@
           <a:p>
             <a:pPr lvl="0"/>
             <a:r>
-              <a:rPr lang="en-US" smtClean="0"/>
+              <a:rPr lang="en-US"/>
               <a:t>Click to edit Master text styles</a:t>
             </a:r>
           </a:p>
           <a:p>
             <a:pPr lvl="1"/>
             <a:r>
-              <a:rPr lang="en-US" smtClean="0"/>
+              <a:rPr lang="en-US"/>
               <a:t>Second level</a:t>
             </a:r>
           </a:p>
           <a:p>
             <a:pPr lvl="2"/>
             <a:r>
-              <a:rPr lang="en-US" smtClean="0"/>
+              <a:rPr lang="en-US"/>
               <a:t>Third level</a:t>
             </a:r>
           </a:p>
           <a:p>
             <a:pPr lvl="3"/>
             <a:r>
-              <a:rPr lang="en-US" smtClean="0"/>
+              <a:rPr lang="en-US"/>
               <a:t>Fourth level</a:t>
             </a:r>
           </a:p>
           <a:p>
             <a:pPr lvl="4"/>
             <a:r>
-              <a:rPr lang="en-US" smtClean="0"/>
+              <a:rPr lang="en-US"/>
               <a:t>Fifth level</a:t>
             </a:r>
             <a:endParaRPr lang="en-US" dirty="0"/>
@@ -2316,7 +2291,7 @@
           <a:p>
             <a:pPr lvl="0"/>
             <a:r>
-              <a:rPr lang="en-US" smtClean="0"/>
+              <a:rPr lang="en-US"/>
               <a:t>Click to edit Master text styles</a:t>
             </a:r>
           </a:p>
@@ -2372,35 +2347,35 @@
           <a:p>
             <a:pPr lvl="0"/>
             <a:r>
-              <a:rPr lang="en-US" smtClean="0"/>
+              <a:rPr lang="en-US"/>
               <a:t>Click to edit Master text styles</a:t>
             </a:r>
           </a:p>
           <a:p>
             <a:pPr lvl="1"/>
             <a:r>
-              <a:rPr lang="en-US" smtClean="0"/>
+              <a:rPr lang="en-US"/>
               <a:t>Second level</a:t>
             </a:r>
           </a:p>
           <a:p>
             <a:pPr lvl="2"/>
             <a:r>
-              <a:rPr lang="en-US" smtClean="0"/>
+              <a:rPr lang="en-US"/>
               <a:t>Third level</a:t>
             </a:r>
           </a:p>
           <a:p>
             <a:pPr lvl="3"/>
             <a:r>
-              <a:rPr lang="en-US" smtClean="0"/>
+              <a:rPr lang="en-US"/>
               <a:t>Fourth level</a:t>
             </a:r>
           </a:p>
           <a:p>
             <a:pPr lvl="4"/>
             <a:r>
-              <a:rPr lang="en-US" smtClean="0"/>
+              <a:rPr lang="en-US"/>
               <a:t>Fifth level</a:t>
             </a:r>
             <a:endParaRPr lang="en-US" dirty="0"/>
@@ -2448,10 +2423,9 @@
           <a:lstStyle/>
           <a:p>
             <a:r>
-              <a:rPr lang="en-US" smtClean="0"/>
+              <a:rPr lang="en-US"/>
               <a:t>Click to edit Master title style</a:t>
             </a:r>
-            <a:endParaRPr lang="en-US"/>
           </a:p>
         </p:txBody>
       </p:sp>
@@ -2530,10 +2504,9 @@
           </a:lstStyle>
           <a:p>
             <a:r>
-              <a:rPr lang="en-US" smtClean="0"/>
+              <a:rPr lang="en-US"/>
               <a:t>Click to edit Master title style</a:t>
             </a:r>
-            <a:endParaRPr lang="en-US"/>
           </a:p>
         </p:txBody>
       </p:sp>
@@ -2587,38 +2560,37 @@
           <a:p>
             <a:pPr lvl="0"/>
             <a:r>
-              <a:rPr lang="en-US" smtClean="0"/>
+              <a:rPr lang="en-US"/>
               <a:t>Click to edit Master text styles</a:t>
             </a:r>
           </a:p>
           <a:p>
             <a:pPr lvl="1"/>
             <a:r>
-              <a:rPr lang="en-US" smtClean="0"/>
+              <a:rPr lang="en-US"/>
               <a:t>Second level</a:t>
             </a:r>
           </a:p>
           <a:p>
             <a:pPr lvl="2"/>
             <a:r>
-              <a:rPr lang="en-US" smtClean="0"/>
+              <a:rPr lang="en-US"/>
               <a:t>Third level</a:t>
             </a:r>
           </a:p>
           <a:p>
             <a:pPr lvl="3"/>
             <a:r>
-              <a:rPr lang="en-US" smtClean="0"/>
+              <a:rPr lang="en-US"/>
               <a:t>Fourth level</a:t>
             </a:r>
           </a:p>
           <a:p>
             <a:pPr lvl="4"/>
             <a:r>
-              <a:rPr lang="en-US" smtClean="0"/>
+              <a:rPr lang="en-US"/>
               <a:t>Fifth level</a:t>
             </a:r>
-            <a:endParaRPr lang="en-US"/>
           </a:p>
         </p:txBody>
       </p:sp>
@@ -2681,7 +2653,7 @@
           <a:p>
             <a:pPr lvl="0"/>
             <a:r>
-              <a:rPr lang="en-US" smtClean="0"/>
+              <a:rPr lang="en-US"/>
               <a:t>Click to edit Master text styles</a:t>
             </a:r>
           </a:p>
@@ -2737,10 +2709,9 @@
           </a:lstStyle>
           <a:p>
             <a:r>
-              <a:rPr lang="en-US" smtClean="0"/>
+              <a:rPr lang="en-US"/>
               <a:t>Click to edit Master title style</a:t>
             </a:r>
-            <a:endParaRPr lang="en-US"/>
           </a:p>
         </p:txBody>
       </p:sp>
@@ -2803,10 +2774,9 @@
           <a:p>
             <a:pPr lvl="0"/>
             <a:r>
-              <a:rPr lang="en-US" noProof="0" smtClean="0"/>
+              <a:rPr lang="en-US" noProof="0"/>
               <a:t>Click icon to add picture</a:t>
             </a:r>
-            <a:endParaRPr lang="en-US" noProof="0"/>
           </a:p>
         </p:txBody>
       </p:sp>
@@ -2869,7 +2839,7 @@
           <a:p>
             <a:pPr lvl="0"/>
             <a:r>
-              <a:rPr lang="en-US" smtClean="0"/>
+              <a:rPr lang="en-US"/>
               <a:t>Click to edit Master text styles</a:t>
             </a:r>
           </a:p>
@@ -2944,38 +2914,38 @@
           <a:p>
             <a:pPr lvl="0"/>
             <a:r>
-              <a:rPr lang="en-US" smtClean="0"/>
+              <a:rPr lang="en-US"/>
               <a:t>Click to edit Master text styles</a:t>
             </a:r>
           </a:p>
           <a:p>
             <a:pPr lvl="1"/>
             <a:r>
-              <a:rPr lang="en-US" smtClean="0"/>
+              <a:rPr lang="en-US"/>
               <a:t>Second level</a:t>
             </a:r>
           </a:p>
           <a:p>
             <a:pPr lvl="2"/>
             <a:r>
-              <a:rPr lang="en-US" smtClean="0"/>
+              <a:rPr lang="en-US"/>
               <a:t>Third level</a:t>
             </a:r>
           </a:p>
           <a:p>
             <a:pPr lvl="3"/>
             <a:r>
-              <a:rPr lang="en-US" smtClean="0"/>
+              <a:rPr lang="en-US"/>
               <a:t>Fourth level</a:t>
             </a:r>
           </a:p>
           <a:p>
             <a:pPr lvl="4"/>
             <a:r>
-              <a:rPr lang="en-US" smtClean="0"/>
+              <a:rPr lang="en-US"/>
               <a:t>Fifth level</a:t>
             </a:r>
-            <a:endParaRPr lang="en-CA" smtClean="0"/>
+            <a:endParaRPr lang="en-CA"/>
           </a:p>
         </p:txBody>
       </p:sp>
@@ -3120,10 +3090,10 @@
           <a:p>
             <a:pPr lvl="0"/>
             <a:r>
-              <a:rPr lang="en-US" smtClean="0"/>
+              <a:rPr lang="en-US"/>
               <a:t>Click to edit Master title style</a:t>
             </a:r>
-            <a:endParaRPr lang="en-CA" smtClean="0"/>
+            <a:endParaRPr lang="en-CA"/>
           </a:p>
         </p:txBody>
       </p:sp>
@@ -3206,7 +3176,7 @@
               <a:defRPr/>
             </a:pPr>
             <a:r>
-              <a:rPr lang="en-CA" sz="1400" i="1" dirty="0" smtClean="0">
+              <a:rPr lang="en-CA" sz="1400" i="1" dirty="0">
                 <a:solidFill>
                   <a:schemeClr val="accent2">
                     <a:lumMod val="50000"/>
@@ -3216,18 +3186,8 @@
               </a:rPr>
               <a:t>– Software Project Concepts –</a:t>
             </a:r>
-            <a:r>
-              <a:rPr lang="en-CA" sz="2800" i="1" dirty="0" smtClean="0">
-                <a:solidFill>
-                  <a:schemeClr val="accent2">
-                    <a:lumMod val="50000"/>
-                  </a:schemeClr>
-                </a:solidFill>
-              </a:rPr>
-              <a:t/>
-            </a:r>
             <a:br>
-              <a:rPr lang="en-CA" sz="2800" i="1" dirty="0" smtClean="0">
+              <a:rPr lang="en-CA" sz="2800" i="1" dirty="0">
                 <a:solidFill>
                   <a:schemeClr val="accent2">
                     <a:lumMod val="50000"/>
@@ -3236,7 +3196,7 @@
               </a:rPr>
             </a:br>
             <a:r>
-              <a:rPr lang="en-CA" sz="2000" dirty="0" smtClean="0">
+              <a:rPr lang="en-CA" sz="2000" dirty="0">
                 <a:solidFill>
                   <a:schemeClr val="accent2">
                     <a:lumMod val="50000"/>
@@ -3702,29 +3662,25 @@
           <a:p>
             <a:pPr eaLnBrk="1" hangingPunct="1"/>
             <a:r>
-              <a:rPr lang="en-US" dirty="0" smtClean="0"/>
+              <a:rPr lang="en-US" dirty="0"/>
               <a:t>PROJ 216</a:t>
             </a:r>
-            <a:r>
-              <a:rPr lang="en-US" b="0" dirty="0" smtClean="0"/>
-              <a:t/>
-            </a:r>
             <a:br>
-              <a:rPr lang="en-US" b="0" dirty="0" smtClean="0"/>
+              <a:rPr lang="en-US" b="0" dirty="0"/>
             </a:br>
             <a:r>
-              <a:rPr lang="en-US" dirty="0" smtClean="0"/>
+              <a:rPr lang="en-US" dirty="0"/>
               <a:t>Software Project Concepts</a:t>
             </a:r>
           </a:p>
           <a:p>
             <a:pPr eaLnBrk="1" hangingPunct="1"/>
-            <a:endParaRPr lang="en-US" dirty="0" smtClean="0"/>
+            <a:endParaRPr lang="en-US" dirty="0"/>
           </a:p>
           <a:p>
             <a:pPr eaLnBrk="1" hangingPunct="1"/>
             <a:r>
-              <a:rPr lang="en-CA" dirty="0" smtClean="0"/>
+              <a:rPr lang="en-CA" dirty="0"/>
               <a:t>Day 1</a:t>
             </a:r>
           </a:p>
@@ -3735,13 +3691,6 @@
   <p:clrMapOvr>
     <a:masterClrMapping/>
   </p:clrMapOvr>
-  <p:timing>
-    <p:tnLst>
-      <p:par>
-        <p:cTn id="1" dur="indefinite" restart="never" nodeType="tmRoot"/>
-      </p:par>
-    </p:tnLst>
-  </p:timing>
 </p:sld>
 </file>
 
@@ -3784,7 +3733,7 @@
           <a:p>
             <a:pPr eaLnBrk="1" hangingPunct="1"/>
             <a:r>
-              <a:rPr lang="en-CA" smtClean="0"/>
+              <a:rPr lang="en-CA"/>
               <a:t>Project Management</a:t>
             </a:r>
           </a:p>
@@ -3812,7 +3761,7 @@
           <a:p>
             <a:pPr eaLnBrk="1" hangingPunct="1"/>
             <a:r>
-              <a:rPr lang="en-CA" dirty="0" smtClean="0"/>
+              <a:rPr lang="en-CA" dirty="0"/>
               <a:t>“Discipline of planning, organizing, and managing resources to bring about the successful completion of specific project goals and objectives” </a:t>
             </a:r>
           </a:p>
@@ -3844,7 +3793,7 @@
           <a:p>
             <a:pPr eaLnBrk="1" hangingPunct="1"/>
             <a:r>
-              <a:rPr lang="en-US" sz="2400" dirty="0" smtClean="0">
+              <a:rPr lang="en-US" sz="2400" dirty="0">
                 <a:solidFill>
                   <a:srgbClr val="002060"/>
                 </a:solidFill>
@@ -3857,17 +3806,8 @@
               <a:rPr lang="en-US" dirty="0">
                 <a:hlinkClick r:id="rId3"/>
               </a:rPr>
-              <a:t>https://www.planningproapp.com/blog/complete-collection-project-management-statistics-2016</a:t>
-            </a:r>
-            <a:r>
-              <a:rPr lang="en-US" dirty="0" smtClean="0">
-                <a:hlinkClick r:id="rId3"/>
-              </a:rPr>
-              <a:t>/</a:t>
-            </a:r>
-            <a:endParaRPr lang="en-US" dirty="0">
-              <a:hlinkClick r:id="rId3"/>
-            </a:endParaRPr>
+              <a:t>https://www.planningproapp.com/blog/complete-collection-project-management-statistics-2016/</a:t>
+            </a:r>
           </a:p>
           <a:p>
             <a:r>
@@ -3880,7 +3820,7 @@
           </a:p>
           <a:p>
             <a:pPr lvl="1" eaLnBrk="1" hangingPunct="1"/>
-            <a:endParaRPr lang="en-US" sz="2400" dirty="0" smtClean="0">
+            <a:endParaRPr lang="en-US" sz="2400" dirty="0">
               <a:solidFill>
                 <a:srgbClr val="002060"/>
               </a:solidFill>
@@ -3893,13 +3833,6 @@
   <p:clrMapOvr>
     <a:masterClrMapping/>
   </p:clrMapOvr>
-  <p:timing>
-    <p:tnLst>
-      <p:par>
-        <p:cTn id="1" dur="indefinite" restart="never" nodeType="tmRoot"/>
-      </p:par>
-    </p:tnLst>
-  </p:timing>
 </p:sld>
 </file>
 
@@ -3942,10 +3875,10 @@
           <a:p>
             <a:pPr eaLnBrk="1" hangingPunct="1"/>
             <a:r>
-              <a:rPr lang="en-GB" smtClean="0"/>
+              <a:rPr lang="en-GB"/>
               <a:t>Project Management Institute</a:t>
             </a:r>
-            <a:endParaRPr lang="en-US" smtClean="0"/>
+            <a:endParaRPr lang="en-US"/>
           </a:p>
         </p:txBody>
       </p:sp>
@@ -4037,13 +3970,7 @@
               <a:rPr lang="en-US" sz="2200" dirty="0">
                 <a:latin typeface="Tahoma" pitchFamily="34" charset="0"/>
               </a:rPr>
-              <a:t>PM Body of </a:t>
-            </a:r>
-            <a:r>
-              <a:rPr lang="en-US" sz="2200" dirty="0" smtClean="0">
-                <a:latin typeface="Tahoma" pitchFamily="34" charset="0"/>
-              </a:rPr>
-              <a:t>Knowledge (PMBOK)</a:t>
+              <a:t>PM Body of Knowledge (PMBOK)</a:t>
             </a:r>
           </a:p>
           <a:p>
@@ -4058,14 +3985,11 @@
               <a:buChar char="•"/>
             </a:pPr>
             <a:r>
-              <a:rPr lang="en-US" sz="2200" i="1" dirty="0" smtClean="0">
+              <a:rPr lang="en-US" sz="2200" i="1" dirty="0">
                 <a:latin typeface="Tahoma" pitchFamily="34" charset="0"/>
               </a:rPr>
               <a:t>A Guide to Project Management Body of Knowledge (PMBOK Guide) 2013 is available at the SAIT Library (e-book)</a:t>
             </a:r>
-            <a:endParaRPr lang="en-US" sz="2200" i="1" dirty="0">
-              <a:latin typeface="Tahoma" pitchFamily="34" charset="0"/>
-            </a:endParaRPr>
           </a:p>
           <a:p>
             <a:pPr marL="285750" indent="-285750">
@@ -4082,13 +4006,7 @@
               <a:rPr lang="en-US" sz="2200" dirty="0">
                 <a:latin typeface="Tahoma" pitchFamily="34" charset="0"/>
               </a:rPr>
-              <a:t>Code of </a:t>
-            </a:r>
-            <a:r>
-              <a:rPr lang="en-US" sz="2200" dirty="0" smtClean="0">
-                <a:latin typeface="Tahoma" pitchFamily="34" charset="0"/>
-              </a:rPr>
-              <a:t>Ethics</a:t>
+              <a:t>Code of Ethics</a:t>
             </a:r>
           </a:p>
           <a:p>
@@ -4103,13 +4021,13 @@
               <a:buChar char="•"/>
             </a:pPr>
             <a:r>
-              <a:rPr lang="en-US" sz="2200" dirty="0" smtClean="0">
+              <a:rPr lang="en-US" sz="2200" dirty="0">
                 <a:latin typeface="Tahoma" pitchFamily="34" charset="0"/>
                 <a:hlinkClick r:id="rId3"/>
               </a:rPr>
               <a:t>http://www.pmi.org/~/media/PDF/Ethics/ap_pmicodeofethics.ashx</a:t>
             </a:r>
-            <a:endParaRPr lang="en-US" sz="2200" dirty="0" smtClean="0">
+            <a:endParaRPr lang="en-US" sz="2200" dirty="0">
               <a:latin typeface="Tahoma" pitchFamily="34" charset="0"/>
             </a:endParaRPr>
           </a:p>
@@ -4120,13 +4038,6 @@
   <p:clrMapOvr>
     <a:masterClrMapping/>
   </p:clrMapOvr>
-  <p:timing>
-    <p:tnLst>
-      <p:par>
-        <p:cTn id="1" dur="indefinite" restart="never" nodeType="tmRoot"/>
-      </p:par>
-    </p:tnLst>
-  </p:timing>
 </p:sld>
 </file>
 
@@ -4169,10 +4080,10 @@
           <a:p>
             <a:pPr eaLnBrk="1" hangingPunct="1"/>
             <a:r>
-              <a:rPr lang="en-GB" smtClean="0"/>
+              <a:rPr lang="en-GB"/>
               <a:t>Project Management</a:t>
             </a:r>
-            <a:endParaRPr lang="en-US" smtClean="0"/>
+            <a:endParaRPr lang="en-US"/>
           </a:p>
         </p:txBody>
       </p:sp>
@@ -4395,13 +4306,6 @@
   <p:clrMapOvr>
     <a:masterClrMapping/>
   </p:clrMapOvr>
-  <p:timing>
-    <p:tnLst>
-      <p:par>
-        <p:cTn id="1" dur="indefinite" restart="never" nodeType="tmRoot"/>
-      </p:par>
-    </p:tnLst>
-  </p:timing>
 </p:sld>
 </file>
 
@@ -4438,10 +4342,9 @@
           <a:lstStyle/>
           <a:p>
             <a:r>
-              <a:rPr lang="en-CA" dirty="0" smtClean="0"/>
+              <a:rPr lang="en-CA" dirty="0"/>
               <a:t>Project Management Triangle</a:t>
             </a:r>
-            <a:endParaRPr lang="en-CA" dirty="0"/>
           </a:p>
         </p:txBody>
       </p:sp>
@@ -4461,10 +4364,9 @@
           <a:lstStyle/>
           <a:p>
             <a:r>
-              <a:rPr lang="en-CA" dirty="0" smtClean="0"/>
+              <a:rPr lang="en-CA" dirty="0"/>
               <a:t>Alternate view</a:t>
             </a:r>
-            <a:endParaRPr lang="en-CA" dirty="0"/>
           </a:p>
         </p:txBody>
       </p:sp>
@@ -4520,7 +4422,7 @@
               <a:buNone/>
               <a:tabLst/>
             </a:pPr>
-            <a:endParaRPr kumimoji="1" lang="en-CA" sz="2800" b="0" i="0" u="none" strike="noStrike" cap="none" normalizeH="0" baseline="0" smtClean="0">
+            <a:endParaRPr kumimoji="1" lang="en-CA" sz="2800" b="0" i="0" u="none" strike="noStrike" cap="none" normalizeH="0" baseline="0">
               <a:ln>
                 <a:noFill/>
               </a:ln>
@@ -4556,10 +4458,9 @@
           <a:lstStyle/>
           <a:p>
             <a:r>
-              <a:rPr lang="en-CA" dirty="0" smtClean="0"/>
+              <a:rPr lang="en-CA" dirty="0"/>
               <a:t>Scope/ Quality</a:t>
             </a:r>
-            <a:endParaRPr lang="en-CA" dirty="0"/>
           </a:p>
         </p:txBody>
       </p:sp>
@@ -4586,10 +4487,9 @@
           <a:lstStyle/>
           <a:p>
             <a:r>
-              <a:rPr lang="en-CA" dirty="0" smtClean="0"/>
+              <a:rPr lang="en-CA" dirty="0"/>
               <a:t>Time</a:t>
             </a:r>
-            <a:endParaRPr lang="en-CA" dirty="0"/>
           </a:p>
         </p:txBody>
       </p:sp>
@@ -4616,10 +4516,9 @@
           <a:lstStyle/>
           <a:p>
             <a:r>
-              <a:rPr lang="en-CA" dirty="0" smtClean="0"/>
+              <a:rPr lang="en-CA" dirty="0"/>
               <a:t>Cost</a:t>
             </a:r>
-            <a:endParaRPr lang="en-CA" dirty="0"/>
           </a:p>
         </p:txBody>
       </p:sp>
@@ -4628,13 +4527,6 @@
   <p:clrMapOvr>
     <a:masterClrMapping/>
   </p:clrMapOvr>
-  <p:timing>
-    <p:tnLst>
-      <p:par>
-        <p:cTn id="1" dur="indefinite" restart="never" nodeType="tmRoot"/>
-      </p:par>
-    </p:tnLst>
-  </p:timing>
 </p:sld>
 </file>
 
@@ -4677,10 +4569,10 @@
           <a:p>
             <a:pPr eaLnBrk="1" hangingPunct="1"/>
             <a:r>
-              <a:rPr lang="en-GB" smtClean="0"/>
+              <a:rPr lang="en-GB"/>
               <a:t>Project Management</a:t>
             </a:r>
-            <a:endParaRPr lang="en-US" smtClean="0"/>
+            <a:endParaRPr lang="en-US"/>
           </a:p>
         </p:txBody>
       </p:sp>
@@ -4762,17 +4654,8 @@
               <a:rPr lang="en-US" sz="2200" dirty="0">
                 <a:latin typeface="Tahoma" pitchFamily="34" charset="0"/>
               </a:rPr>
-              <a:t>Planning &amp; </a:t>
-            </a:r>
-            <a:r>
-              <a:rPr lang="en-US" sz="2200" dirty="0" smtClean="0">
-                <a:latin typeface="Tahoma" pitchFamily="34" charset="0"/>
-              </a:rPr>
-              <a:t>organizing</a:t>
-            </a:r>
-            <a:endParaRPr lang="en-US" sz="2200" dirty="0">
-              <a:latin typeface="Tahoma" pitchFamily="34" charset="0"/>
-            </a:endParaRPr>
+              <a:t>Planning &amp; organizing</a:t>
+            </a:r>
           </a:p>
           <a:p>
             <a:pPr marL="742950" lvl="1" indent="-285750">
@@ -5086,10 +4969,9 @@
           <a:lstStyle/>
           <a:p>
             <a:r>
-              <a:rPr lang="en-US" dirty="0" smtClean="0"/>
+              <a:rPr lang="en-US" dirty="0"/>
               <a:t>10 Knowledge Areas</a:t>
             </a:r>
-            <a:endParaRPr lang="en-US" dirty="0"/>
           </a:p>
         </p:txBody>
       </p:sp>
@@ -5168,10 +5050,9 @@
           <a:lstStyle/>
           <a:p>
             <a:r>
-              <a:rPr lang="en-US" dirty="0" smtClean="0"/>
+              <a:rPr lang="en-US" dirty="0"/>
               <a:t>Resources: 10 Knowledge Areas </a:t>
             </a:r>
-            <a:endParaRPr lang="en-US" dirty="0"/>
           </a:p>
         </p:txBody>
       </p:sp>
@@ -5194,57 +5075,39 @@
               <a:rPr lang="en-US" dirty="0">
                 <a:hlinkClick r:id="rId2"/>
               </a:rPr>
-              <a:t>https://blog.masterofproject.com/pmbok-pdf</a:t>
-            </a:r>
-            <a:r>
-              <a:rPr lang="en-US" dirty="0" smtClean="0">
-                <a:hlinkClick r:id="rId2"/>
-              </a:rPr>
-              <a:t>/</a:t>
-            </a:r>
-            <a:endParaRPr lang="en-US" dirty="0" smtClean="0"/>
+              <a:t>https://blog.masterofproject.com/pmbok-pdf/</a:t>
+            </a:r>
+            <a:endParaRPr lang="en-US" dirty="0"/>
           </a:p>
           <a:p>
             <a:pPr marL="0" indent="0">
               <a:buNone/>
             </a:pPr>
-            <a:endParaRPr lang="en-US" dirty="0" smtClean="0"/>
+            <a:endParaRPr lang="en-US" dirty="0"/>
           </a:p>
           <a:p>
             <a:r>
               <a:rPr lang="en-US" dirty="0">
                 <a:hlinkClick r:id="rId3"/>
               </a:rPr>
-              <a:t>https://</a:t>
-            </a:r>
-            <a:r>
-              <a:rPr lang="en-US" dirty="0" smtClean="0">
-                <a:hlinkClick r:id="rId3"/>
-              </a:rPr>
-              <a:t>www.projectmanager.com/blog/10-project-management-knowledge-areas</a:t>
-            </a:r>
-            <a:endParaRPr lang="en-US" dirty="0" smtClean="0"/>
+              <a:t>https://www.projectmanager.com/blog/10-project-management-knowledge-areas</a:t>
+            </a:r>
+            <a:endParaRPr lang="en-US" dirty="0"/>
           </a:p>
           <a:p>
             <a:pPr marL="0" indent="0">
               <a:buNone/>
             </a:pPr>
-            <a:endParaRPr lang="en-US" dirty="0" smtClean="0"/>
+            <a:endParaRPr lang="en-US" dirty="0"/>
           </a:p>
           <a:p>
             <a:r>
               <a:rPr lang="en-US" dirty="0">
                 <a:hlinkClick r:id="rId4"/>
               </a:rPr>
-              <a:t>https://</a:t>
-            </a:r>
-            <a:r>
-              <a:rPr lang="en-US" dirty="0" smtClean="0">
-                <a:hlinkClick r:id="rId4"/>
-              </a:rPr>
-              <a:t>www.workfront.com/blog/10-project-management-knowledge-areas-what-you-need-to-know</a:t>
-            </a:r>
-            <a:endParaRPr lang="en-US" dirty="0" smtClean="0"/>
+              <a:t>https://www.workfront.com/blog/10-project-management-knowledge-areas-what-you-need-to-know</a:t>
+            </a:r>
+            <a:endParaRPr lang="en-US" dirty="0"/>
           </a:p>
           <a:p>
             <a:endParaRPr lang="en-US" dirty="0"/>
@@ -5302,7 +5165,7 @@
           <a:lstStyle/>
           <a:p>
             <a:r>
-              <a:rPr lang="ja-JP" altLang="en-US" dirty="0" smtClean="0"/>
+              <a:rPr lang="ja-JP" altLang="en-US" dirty="0"/>
               <a:t>コミュ発表</a:t>
             </a:r>
             <a:endParaRPr lang="en-US" dirty="0"/>
@@ -5330,16 +5193,6 @@
           <a:lstStyle/>
           <a:p>
             <a:r>
-              <a:rPr lang="en-US" sz="2000" dirty="0" smtClean="0">
-                <a:solidFill>
-                  <a:schemeClr val="bg2"/>
-                </a:solidFill>
-                <a:latin typeface="Times New Roman" panose="02020603050405020304" pitchFamily="18" charset="0"/>
-                <a:cs typeface="Times New Roman" panose="02020603050405020304" pitchFamily="18" charset="0"/>
-              </a:rPr>
-              <a:t>Communications </a:t>
-            </a:r>
-            <a:r>
               <a:rPr lang="en-US" sz="2000" dirty="0">
                 <a:solidFill>
                   <a:schemeClr val="bg2"/>
@@ -5347,65 +5200,17 @@
                 <a:latin typeface="Times New Roman" panose="02020603050405020304" pitchFamily="18" charset="0"/>
                 <a:cs typeface="Times New Roman" panose="02020603050405020304" pitchFamily="18" charset="0"/>
               </a:rPr>
-              <a:t>might be paramount as it informs every aspect of the project. </a:t>
-            </a:r>
-            <a:r>
-              <a:rPr lang="en-US" sz="2000" dirty="0" smtClean="0">
-                <a:solidFill>
-                  <a:schemeClr val="bg2"/>
-                </a:solidFill>
-                <a:latin typeface="Times New Roman" panose="02020603050405020304" pitchFamily="18" charset="0"/>
-                <a:cs typeface="Times New Roman" panose="02020603050405020304" pitchFamily="18" charset="0"/>
-              </a:rPr>
-              <a:t>Communications inform </a:t>
-            </a:r>
-            <a:r>
-              <a:rPr lang="en-US" sz="2000" dirty="0">
-                <a:solidFill>
-                  <a:schemeClr val="bg2"/>
-                </a:solidFill>
-                <a:latin typeface="Times New Roman" panose="02020603050405020304" pitchFamily="18" charset="0"/>
-                <a:cs typeface="Times New Roman" panose="02020603050405020304" pitchFamily="18" charset="0"/>
-              </a:rPr>
-              <a:t>the team and stakeholders, therefore the need to plan communications management is a critical step in any project</a:t>
-            </a:r>
-            <a:r>
-              <a:rPr lang="en-US" sz="2000" dirty="0" smtClean="0">
-                <a:solidFill>
-                  <a:schemeClr val="bg2"/>
-                </a:solidFill>
-                <a:latin typeface="Times New Roman" panose="02020603050405020304" pitchFamily="18" charset="0"/>
-                <a:cs typeface="Times New Roman" panose="02020603050405020304" pitchFamily="18" charset="0"/>
-              </a:rPr>
-              <a:t>.</a:t>
-            </a:r>
-          </a:p>
-          <a:p>
-            <a:r>
-              <a:rPr lang="en-US" sz="2000" dirty="0" smtClean="0">
-                <a:latin typeface="Times New Roman" panose="02020603050405020304" pitchFamily="18" charset="0"/>
-                <a:cs typeface="Times New Roman" panose="02020603050405020304" pitchFamily="18" charset="0"/>
-              </a:rPr>
-              <a:t>Define: Com </a:t>
-            </a:r>
+              <a:t>Communications might be paramount as it informs every aspect of the project. Communications inform the team and stakeholders, therefore the need to plan communications management is a critical step in any project.</a:t>
+            </a:r>
+          </a:p>
+          <a:p>
             <a:r>
               <a:rPr lang="en-US" sz="2000" dirty="0">
                 <a:latin typeface="Times New Roman" panose="02020603050405020304" pitchFamily="18" charset="0"/>
                 <a:cs typeface="Times New Roman" panose="02020603050405020304" pitchFamily="18" charset="0"/>
               </a:rPr>
-              <a:t>is all about informing the </a:t>
-            </a:r>
-            <a:r>
-              <a:rPr lang="en-US" sz="2000" dirty="0" smtClean="0">
-                <a:latin typeface="Times New Roman" panose="02020603050405020304" pitchFamily="18" charset="0"/>
-                <a:cs typeface="Times New Roman" panose="02020603050405020304" pitchFamily="18" charset="0"/>
-              </a:rPr>
-              <a:t>right members on the right time the information they need to know, which includes but not limited to deadlines, required quality, funds, changes.</a:t>
-            </a:r>
-            <a:endParaRPr lang="en-US" sz="2000" dirty="0">
-              <a:latin typeface="Times New Roman" panose="02020603050405020304" pitchFamily="18" charset="0"/>
-              <a:cs typeface="Times New Roman" panose="02020603050405020304" pitchFamily="18" charset="0"/>
-            </a:endParaRPr>
+              <a:t>Define: Com is all about informing the right members on the right time the information they need to know, which includes but not limited to deadlines, required quality, funds, changes.</a:t>
+            </a:r>
           </a:p>
           <a:p>
             <a:r>
@@ -5418,30 +5223,16 @@
           </a:p>
           <a:p>
             <a:r>
-              <a:rPr lang="en-US" sz="2000" dirty="0" smtClean="0">
-                <a:latin typeface="Times New Roman" panose="02020603050405020304" pitchFamily="18" charset="0"/>
-                <a:cs typeface="Times New Roman" panose="02020603050405020304" pitchFamily="18" charset="0"/>
-              </a:rPr>
-              <a:t>Before start: How com is done &amp; What frequency &amp; </a:t>
-            </a:r>
-            <a:r>
               <a:rPr lang="en-US" sz="2000" dirty="0">
                 <a:latin typeface="Times New Roman" panose="02020603050405020304" pitchFamily="18" charset="0"/>
                 <a:cs typeface="Times New Roman" panose="02020603050405020304" pitchFamily="18" charset="0"/>
               </a:rPr>
-              <a:t>Who needs What and </a:t>
-            </a:r>
-            <a:r>
-              <a:rPr lang="en-US" sz="2000" dirty="0" smtClean="0">
-                <a:latin typeface="Times New Roman" panose="02020603050405020304" pitchFamily="18" charset="0"/>
-                <a:cs typeface="Times New Roman" panose="02020603050405020304" pitchFamily="18" charset="0"/>
-              </a:rPr>
-              <a:t>When</a:t>
-            </a:r>
-          </a:p>
-          <a:p>
-            <a:r>
-              <a:rPr lang="en-US" sz="2000" dirty="0" smtClean="0">
+              <a:t>Before start: How com is done &amp; What frequency &amp; Who needs What and When</a:t>
+            </a:r>
+          </a:p>
+          <a:p>
+            <a:r>
+              <a:rPr lang="en-US" sz="2000" dirty="0">
                 <a:latin typeface="Times New Roman" panose="02020603050405020304" pitchFamily="18" charset="0"/>
                 <a:cs typeface="Times New Roman" panose="02020603050405020304" pitchFamily="18" charset="0"/>
               </a:rPr>
@@ -5539,10 +5330,10 @@
           <a:p>
             <a:pPr eaLnBrk="1" hangingPunct="1"/>
             <a:r>
-              <a:rPr lang="en-GB" dirty="0" smtClean="0"/>
+              <a:rPr lang="en-GB" dirty="0"/>
               <a:t>Exercise</a:t>
             </a:r>
-            <a:endParaRPr lang="en-US" dirty="0" smtClean="0"/>
+            <a:endParaRPr lang="en-US" dirty="0"/>
           </a:p>
         </p:txBody>
       </p:sp>
@@ -5584,14 +5375,11 @@
               <a:defRPr/>
             </a:pPr>
             <a:r>
-              <a:rPr lang="en-US" sz="2200" dirty="0" smtClean="0">
+              <a:rPr lang="en-US" sz="2200" dirty="0">
                 <a:latin typeface="Tahoma" pitchFamily="34" charset="0"/>
               </a:rPr>
               <a:t>Form 10 groups:</a:t>
             </a:r>
-            <a:endParaRPr lang="en-US" sz="2200" dirty="0">
-              <a:latin typeface="Tahoma" pitchFamily="34" charset="0"/>
-            </a:endParaRPr>
           </a:p>
           <a:p>
             <a:pPr marL="914400" lvl="1" indent="-457200">
@@ -5606,7 +5394,7 @@
               <a:defRPr/>
             </a:pPr>
             <a:r>
-              <a:rPr lang="en-US" sz="2200" dirty="0" smtClean="0">
+              <a:rPr lang="en-US" sz="2200" dirty="0">
                 <a:solidFill>
                   <a:schemeClr val="accent5">
                     <a:lumMod val="25000"/>
@@ -5617,16 +5405,10 @@
               <a:t>Scope</a:t>
             </a:r>
             <a:r>
-              <a:rPr lang="en-US" sz="2200" dirty="0" smtClean="0">
-                <a:latin typeface="Tahoma" pitchFamily="34" charset="0"/>
-              </a:rPr>
-              <a:t> </a:t>
-            </a:r>
-            <a:r>
               <a:rPr lang="en-US" sz="2200" dirty="0">
                 <a:latin typeface="Tahoma" pitchFamily="34" charset="0"/>
               </a:rPr>
-              <a:t>Management</a:t>
+              <a:t> Management</a:t>
             </a:r>
           </a:p>
           <a:p>
@@ -5836,13 +5618,7 @@
               <a:rPr lang="en-US" sz="2200" dirty="0">
                 <a:latin typeface="Tahoma" pitchFamily="34" charset="0"/>
               </a:rPr>
-              <a:t> </a:t>
-            </a:r>
-            <a:r>
-              <a:rPr lang="en-US" sz="2200" dirty="0" smtClean="0">
-                <a:latin typeface="Tahoma" pitchFamily="34" charset="0"/>
-              </a:rPr>
-              <a:t>Management</a:t>
+              <a:t> Management</a:t>
             </a:r>
           </a:p>
           <a:p>
@@ -5858,7 +5634,7 @@
               <a:defRPr/>
             </a:pPr>
             <a:r>
-              <a:rPr lang="en-US" sz="2200" dirty="0" smtClean="0">
+              <a:rPr lang="en-US" sz="2200" dirty="0">
                 <a:solidFill>
                   <a:schemeClr val="accent5">
                     <a:lumMod val="25000"/>
@@ -5869,7 +5645,7 @@
               <a:t>Stakeholder</a:t>
             </a:r>
             <a:r>
-              <a:rPr lang="en-US" sz="2200" dirty="0" smtClean="0">
+              <a:rPr lang="en-US" sz="2200" dirty="0">
                 <a:latin typeface="Tahoma" pitchFamily="34" charset="0"/>
               </a:rPr>
               <a:t> Management</a:t>
@@ -5944,13 +5720,6 @@
   <p:clrMapOvr>
     <a:masterClrMapping/>
   </p:clrMapOvr>
-  <p:timing>
-    <p:tnLst>
-      <p:par>
-        <p:cTn id="1" dur="indefinite" restart="never" nodeType="tmRoot"/>
-      </p:par>
-    </p:tnLst>
-  </p:timing>
 </p:sld>
 </file>
 
@@ -5993,10 +5762,10 @@
           <a:p>
             <a:pPr eaLnBrk="1" hangingPunct="1"/>
             <a:r>
-              <a:rPr lang="en-GB" dirty="0" smtClean="0"/>
+              <a:rPr lang="en-GB" dirty="0"/>
               <a:t>Exercise</a:t>
             </a:r>
-            <a:endParaRPr lang="en-US" dirty="0" smtClean="0"/>
+            <a:endParaRPr lang="en-US" dirty="0"/>
           </a:p>
         </p:txBody>
       </p:sp>
@@ -6070,7 +5839,7 @@
               <a:defRPr/>
             </a:pPr>
             <a:r>
-              <a:rPr lang="en-US" sz="2200" dirty="0" smtClean="0">
+              <a:rPr lang="en-US" sz="2200" dirty="0">
                 <a:latin typeface="Tahoma" pitchFamily="34" charset="0"/>
               </a:rPr>
               <a:t>20-30 minutes to prepare, 5 minutes presentation</a:t>
@@ -6089,46 +5858,10 @@
               <a:defRPr/>
             </a:pPr>
             <a:r>
-              <a:rPr lang="en-US" sz="2200" dirty="0" smtClean="0">
-                <a:latin typeface="Tahoma" pitchFamily="34" charset="0"/>
-              </a:rPr>
-              <a:t>Using </a:t>
-            </a:r>
-            <a:r>
               <a:rPr lang="en-US" sz="2200" dirty="0">
                 <a:latin typeface="Tahoma" pitchFamily="34" charset="0"/>
               </a:rPr>
-              <a:t>a Web browser, Research each of your topics and put together a short </a:t>
-            </a:r>
-            <a:r>
-              <a:rPr lang="en-US" sz="2200" dirty="0" smtClean="0">
-                <a:latin typeface="Tahoma" pitchFamily="34" charset="0"/>
-              </a:rPr>
-              <a:t>presentation </a:t>
-            </a:r>
-            <a:r>
-              <a:rPr lang="en-US" sz="2200" dirty="0">
-                <a:latin typeface="Tahoma" pitchFamily="34" charset="0"/>
-              </a:rPr>
-              <a:t>for the rest of the class </a:t>
-            </a:r>
-            <a:r>
-              <a:rPr lang="en-US" sz="2200" dirty="0" smtClean="0">
-                <a:latin typeface="Tahoma" pitchFamily="34" charset="0"/>
-              </a:rPr>
-              <a:t>Tell </a:t>
-            </a:r>
-            <a:r>
-              <a:rPr lang="en-US" sz="2200" dirty="0">
-                <a:latin typeface="Tahoma" pitchFamily="34" charset="0"/>
-              </a:rPr>
-              <a:t>us what the topic is about, why it is important that the project manager is responsible for it, and we will discuss the implications of the responsibility for the success of the </a:t>
-            </a:r>
-            <a:r>
-              <a:rPr lang="en-US" sz="2200" dirty="0" smtClean="0">
-                <a:latin typeface="Tahoma" pitchFamily="34" charset="0"/>
-              </a:rPr>
-              <a:t>project</a:t>
+              <a:t>Using a Web browser, Research each of your topics and put together a short presentation for the rest of the class Tell us what the topic is about, why it is important that the project manager is responsible for it, and we will discuss the implications of the responsibility for the success of the project</a:t>
             </a:r>
           </a:p>
         </p:txBody>
@@ -6138,13 +5871,6 @@
   <p:clrMapOvr>
     <a:masterClrMapping/>
   </p:clrMapOvr>
-  <p:timing>
-    <p:tnLst>
-      <p:par>
-        <p:cTn id="1" dur="indefinite" restart="never" nodeType="tmRoot"/>
-      </p:par>
-    </p:tnLst>
-  </p:timing>
 </p:sld>
 </file>
 
@@ -6186,15 +5912,11 @@
           <a:lstStyle/>
           <a:p>
             <a:pPr eaLnBrk="1" hangingPunct="1"/>
-            <a:r>
-              <a:rPr lang="en-US" smtClean="0"/>
-              <a:t/>
-            </a:r>
             <a:br>
-              <a:rPr lang="en-US" smtClean="0"/>
+              <a:rPr lang="en-US"/>
             </a:br>
             <a:r>
-              <a:rPr lang="en-US" smtClean="0"/>
+              <a:rPr lang="en-US"/>
               <a:t>Day 1 Agenda</a:t>
             </a:r>
           </a:p>
@@ -6237,11 +5959,7 @@
             <a:pPr eaLnBrk="1" hangingPunct="1"/>
             <a:r>
               <a:rPr lang="en-US"/>
-              <a:t>The </a:t>
-            </a:r>
-            <a:r>
-              <a:rPr lang="en-US" smtClean="0"/>
-              <a:t>Proposal</a:t>
+              <a:t>The Proposal</a:t>
             </a:r>
           </a:p>
           <a:p>
@@ -6274,7 +5992,7 @@
               <a:buFont typeface="Monotype Sorts"/>
               <a:buNone/>
             </a:pPr>
-            <a:endParaRPr lang="en-US" dirty="0" smtClean="0"/>
+            <a:endParaRPr lang="en-US" dirty="0"/>
           </a:p>
         </p:txBody>
       </p:sp>
@@ -6283,13 +6001,6 @@
   <p:clrMapOvr>
     <a:masterClrMapping/>
   </p:clrMapOvr>
-  <p:timing>
-    <p:tnLst>
-      <p:par>
-        <p:cTn id="1" dur="indefinite" restart="never" nodeType="tmRoot"/>
-      </p:par>
-    </p:tnLst>
-  </p:timing>
 </p:sld>
 </file>
 
@@ -6332,7 +6043,7 @@
           <a:p>
             <a:pPr eaLnBrk="1" hangingPunct="1"/>
             <a:r>
-              <a:rPr lang="en-CA" smtClean="0"/>
+              <a:rPr lang="en-CA"/>
               <a:t>Project Phases</a:t>
             </a:r>
           </a:p>
@@ -6360,42 +6071,42 @@
           <a:p>
             <a:pPr eaLnBrk="1" hangingPunct="1"/>
             <a:r>
-              <a:rPr lang="en-CA" dirty="0" smtClean="0"/>
+              <a:rPr lang="en-CA" dirty="0"/>
               <a:t>Four Main Phases:</a:t>
             </a:r>
           </a:p>
           <a:p>
             <a:pPr lvl="1" eaLnBrk="1" hangingPunct="1"/>
             <a:r>
-              <a:rPr lang="en-CA" dirty="0" smtClean="0"/>
+              <a:rPr lang="en-CA" dirty="0"/>
               <a:t>Project Initiation (Definition)</a:t>
             </a:r>
           </a:p>
           <a:p>
             <a:pPr lvl="1" eaLnBrk="1" hangingPunct="1"/>
             <a:r>
-              <a:rPr lang="en-CA" dirty="0" smtClean="0"/>
+              <a:rPr lang="en-CA" dirty="0"/>
               <a:t>Project Planning</a:t>
             </a:r>
           </a:p>
           <a:p>
             <a:pPr lvl="1" eaLnBrk="1" hangingPunct="1"/>
             <a:r>
-              <a:rPr lang="en-CA" dirty="0" smtClean="0"/>
+              <a:rPr lang="en-CA" dirty="0"/>
               <a:t>Project Execution</a:t>
             </a:r>
           </a:p>
           <a:p>
             <a:pPr lvl="1" eaLnBrk="1" hangingPunct="1"/>
             <a:r>
-              <a:rPr lang="en-CA" dirty="0" smtClean="0"/>
+              <a:rPr lang="en-CA" dirty="0"/>
               <a:t>Project Closure</a:t>
             </a:r>
           </a:p>
           <a:p>
             <a:pPr eaLnBrk="1" hangingPunct="1"/>
             <a:r>
-              <a:rPr lang="en-CA" dirty="0" smtClean="0"/>
+              <a:rPr lang="en-CA" dirty="0"/>
               <a:t>Usually each phase ends with a Phase Review</a:t>
             </a:r>
           </a:p>
@@ -6406,13 +6117,6 @@
   <p:clrMapOvr>
     <a:masterClrMapping/>
   </p:clrMapOvr>
-  <p:timing>
-    <p:tnLst>
-      <p:par>
-        <p:cTn id="1" dur="indefinite" restart="never" nodeType="tmRoot"/>
-      </p:par>
-    </p:tnLst>
-  </p:timing>
 </p:sld>
 </file>
 
@@ -6455,7 +6159,7 @@
           <a:p>
             <a:pPr eaLnBrk="1" hangingPunct="1"/>
             <a:r>
-              <a:rPr lang="en-CA" smtClean="0"/>
+              <a:rPr lang="en-CA"/>
               <a:t>Project Initiation</a:t>
             </a:r>
           </a:p>
@@ -6483,35 +6187,35 @@
           <a:p>
             <a:pPr eaLnBrk="1" hangingPunct="1"/>
             <a:r>
-              <a:rPr lang="en-CA" dirty="0" smtClean="0"/>
+              <a:rPr lang="en-CA" dirty="0"/>
               <a:t>“Starting up”:</a:t>
             </a:r>
           </a:p>
           <a:p>
             <a:pPr lvl="1" eaLnBrk="1" hangingPunct="1"/>
             <a:r>
-              <a:rPr lang="en-CA" dirty="0" smtClean="0"/>
+              <a:rPr lang="en-CA" dirty="0"/>
               <a:t>Business Case</a:t>
             </a:r>
           </a:p>
           <a:p>
             <a:pPr lvl="1" eaLnBrk="1" hangingPunct="1"/>
             <a:r>
-              <a:rPr lang="en-CA" dirty="0" smtClean="0"/>
+              <a:rPr lang="en-CA" dirty="0"/>
               <a:t>Feasibility Study</a:t>
             </a:r>
           </a:p>
           <a:p>
             <a:pPr lvl="1" eaLnBrk="1" hangingPunct="1"/>
             <a:r>
-              <a:rPr lang="en-CA" dirty="0" smtClean="0"/>
+              <a:rPr lang="en-CA" dirty="0"/>
               <a:t>Terms of Reference</a:t>
             </a:r>
           </a:p>
           <a:p>
             <a:pPr lvl="1" eaLnBrk="1" hangingPunct="1"/>
             <a:r>
-              <a:rPr lang="en-CA" dirty="0" smtClean="0"/>
+              <a:rPr lang="en-CA" dirty="0"/>
               <a:t>Team Job Descriptions</a:t>
             </a:r>
           </a:p>
@@ -6522,13 +6226,6 @@
   <p:clrMapOvr>
     <a:masterClrMapping/>
   </p:clrMapOvr>
-  <p:timing>
-    <p:tnLst>
-      <p:par>
-        <p:cTn id="1" dur="indefinite" restart="never" nodeType="tmRoot"/>
-      </p:par>
-    </p:tnLst>
-  </p:timing>
 </p:sld>
 </file>
 
@@ -6571,8 +6268,8 @@
           <a:p>
             <a:pPr eaLnBrk="1" hangingPunct="1"/>
             <a:r>
-              <a:rPr lang="en-CA" smtClean="0"/>
-              <a:t>Project Definition</a:t>
+              <a:rPr lang="en-CA" dirty="0"/>
+              <a:t>Project Planning</a:t>
             </a:r>
           </a:p>
         </p:txBody>
@@ -6599,33 +6296,33 @@
           <a:p>
             <a:pPr eaLnBrk="1" hangingPunct="1"/>
             <a:r>
-              <a:rPr lang="en-CA" dirty="0" smtClean="0"/>
+              <a:rPr lang="en-CA" dirty="0"/>
               <a:t>Defining the project</a:t>
             </a:r>
           </a:p>
           <a:p>
             <a:pPr lvl="1" eaLnBrk="1" hangingPunct="1"/>
             <a:r>
-              <a:rPr lang="en-CA" dirty="0" err="1" smtClean="0"/>
+              <a:rPr lang="en-CA" dirty="0" err="1"/>
               <a:t>G.Horine</a:t>
             </a:r>
             <a:r>
-              <a:rPr lang="en-CA" dirty="0" smtClean="0"/>
+              <a:rPr lang="en-CA" dirty="0"/>
               <a:t>, “Absolute Beginner’s Guide to Project Management”, 3</a:t>
             </a:r>
             <a:r>
-              <a:rPr lang="en-CA" baseline="30000" dirty="0" smtClean="0"/>
+              <a:rPr lang="en-CA" baseline="30000" dirty="0"/>
               <a:t>rd</a:t>
             </a:r>
             <a:r>
-              <a:rPr lang="en-CA" dirty="0" smtClean="0"/>
+              <a:rPr lang="en-CA" dirty="0"/>
               <a:t> edition, page 47</a:t>
             </a:r>
           </a:p>
           <a:p>
             <a:pPr eaLnBrk="1" hangingPunct="1"/>
             <a:r>
-              <a:rPr lang="en-CA" dirty="0" smtClean="0"/>
+              <a:rPr lang="en-CA" dirty="0"/>
               <a:t>Project Definition Document</a:t>
             </a:r>
           </a:p>
@@ -6633,30 +6330,26 @@
             <a:pPr lvl="1" eaLnBrk="1" hangingPunct="1"/>
             <a:r>
               <a:rPr lang="en-CA" dirty="0"/>
-              <a:t>a</a:t>
-            </a:r>
-            <a:r>
-              <a:rPr lang="en-CA" dirty="0" smtClean="0"/>
-              <a:t>.k.a. Project Charter</a:t>
+              <a:t>a.k.a. Project Charter</a:t>
             </a:r>
           </a:p>
           <a:p>
             <a:pPr eaLnBrk="1" hangingPunct="1"/>
             <a:r>
-              <a:rPr lang="en-CA" dirty="0" smtClean="0"/>
+              <a:rPr lang="en-CA" dirty="0"/>
               <a:t>Required Elements</a:t>
             </a:r>
           </a:p>
           <a:p>
             <a:pPr eaLnBrk="1" hangingPunct="1"/>
             <a:r>
-              <a:rPr lang="en-CA" dirty="0" smtClean="0"/>
+              <a:rPr lang="en-CA" dirty="0"/>
               <a:t>Optional Elements</a:t>
             </a:r>
           </a:p>
           <a:p>
             <a:pPr lvl="1" eaLnBrk="1" hangingPunct="1"/>
-            <a:endParaRPr lang="en-CA" dirty="0" smtClean="0"/>
+            <a:endParaRPr lang="en-CA" dirty="0"/>
           </a:p>
         </p:txBody>
       </p:sp>
@@ -6665,13 +6358,6 @@
   <p:clrMapOvr>
     <a:masterClrMapping/>
   </p:clrMapOvr>
-  <p:timing>
-    <p:tnLst>
-      <p:par>
-        <p:cTn id="1" dur="indefinite" restart="never" nodeType="tmRoot"/>
-      </p:par>
-    </p:tnLst>
-  </p:timing>
 </p:sld>
 </file>
 
@@ -6714,7 +6400,7 @@
           <a:p>
             <a:pPr eaLnBrk="1" hangingPunct="1"/>
             <a:r>
-              <a:rPr lang="en-CA" smtClean="0"/>
+              <a:rPr lang="en-CA"/>
               <a:t>Project Execution</a:t>
             </a:r>
           </a:p>
@@ -6742,63 +6428,63 @@
           <a:p>
             <a:pPr eaLnBrk="1" hangingPunct="1"/>
             <a:r>
-              <a:rPr lang="en-CA" smtClean="0"/>
+              <a:rPr lang="en-CA"/>
               <a:t>Build Deliverables</a:t>
             </a:r>
           </a:p>
           <a:p>
             <a:pPr eaLnBrk="1" hangingPunct="1"/>
             <a:r>
-              <a:rPr lang="en-CA" smtClean="0"/>
+              <a:rPr lang="en-CA"/>
               <a:t>Monitor and Control</a:t>
             </a:r>
           </a:p>
           <a:p>
             <a:pPr lvl="1" eaLnBrk="1" hangingPunct="1"/>
             <a:r>
-              <a:rPr lang="en-CA" smtClean="0"/>
+              <a:rPr lang="en-CA"/>
               <a:t>Time</a:t>
             </a:r>
           </a:p>
           <a:p>
             <a:pPr lvl="1" eaLnBrk="1" hangingPunct="1"/>
             <a:r>
-              <a:rPr lang="en-CA" smtClean="0"/>
+              <a:rPr lang="en-CA"/>
               <a:t>Cost</a:t>
             </a:r>
           </a:p>
           <a:p>
             <a:pPr lvl="1" eaLnBrk="1" hangingPunct="1"/>
             <a:r>
-              <a:rPr lang="en-CA" smtClean="0"/>
+              <a:rPr lang="en-CA"/>
               <a:t>Change</a:t>
             </a:r>
           </a:p>
           <a:p>
             <a:pPr lvl="1" eaLnBrk="1" hangingPunct="1"/>
             <a:r>
-              <a:rPr lang="en-CA" smtClean="0"/>
+              <a:rPr lang="en-CA"/>
               <a:t>Risk</a:t>
             </a:r>
           </a:p>
           <a:p>
             <a:pPr lvl="1" eaLnBrk="1" hangingPunct="1"/>
             <a:r>
-              <a:rPr lang="en-CA" smtClean="0"/>
+              <a:rPr lang="en-CA"/>
               <a:t>Procurement</a:t>
             </a:r>
           </a:p>
           <a:p>
             <a:pPr lvl="1" eaLnBrk="1" hangingPunct="1"/>
             <a:r>
-              <a:rPr lang="en-CA" smtClean="0"/>
+              <a:rPr lang="en-CA"/>
               <a:t>Communications</a:t>
             </a:r>
           </a:p>
           <a:p>
             <a:pPr lvl="1" eaLnBrk="1" hangingPunct="1"/>
             <a:r>
-              <a:rPr lang="en-CA" smtClean="0"/>
+              <a:rPr lang="en-CA"/>
               <a:t>Acceptance</a:t>
             </a:r>
           </a:p>
@@ -6809,13 +6495,6 @@
   <p:clrMapOvr>
     <a:masterClrMapping/>
   </p:clrMapOvr>
-  <p:timing>
-    <p:tnLst>
-      <p:par>
-        <p:cTn id="1" dur="indefinite" restart="never" nodeType="tmRoot"/>
-      </p:par>
-    </p:tnLst>
-  </p:timing>
 </p:sld>
 </file>
 
@@ -6858,7 +6537,7 @@
           <a:p>
             <a:pPr eaLnBrk="1" hangingPunct="1"/>
             <a:r>
-              <a:rPr lang="en-CA" smtClean="0"/>
+              <a:rPr lang="en-CA"/>
               <a:t>Project Closure</a:t>
             </a:r>
           </a:p>
@@ -6886,28 +6565,28 @@
           <a:p>
             <a:pPr eaLnBrk="1" hangingPunct="1"/>
             <a:r>
-              <a:rPr lang="en-CA" dirty="0" smtClean="0"/>
+              <a:rPr lang="en-CA" dirty="0"/>
               <a:t>Project Closure Report</a:t>
             </a:r>
           </a:p>
           <a:p>
             <a:pPr eaLnBrk="1" hangingPunct="1"/>
             <a:r>
-              <a:rPr lang="en-CA" dirty="0" smtClean="0"/>
+              <a:rPr lang="en-CA" dirty="0"/>
               <a:t>Acceptance by the customer</a:t>
             </a:r>
           </a:p>
           <a:p>
             <a:pPr eaLnBrk="1" hangingPunct="1"/>
             <a:r>
-              <a:rPr lang="en-CA" dirty="0" smtClean="0"/>
+              <a:rPr lang="en-CA" dirty="0"/>
               <a:t>Review project completion</a:t>
             </a:r>
           </a:p>
           <a:p>
             <a:pPr lvl="1" eaLnBrk="1" hangingPunct="1"/>
             <a:r>
-              <a:rPr lang="en-CA" dirty="0" smtClean="0"/>
+              <a:rPr lang="en-CA" dirty="0"/>
               <a:t>Lessons learned</a:t>
             </a:r>
           </a:p>
@@ -6918,13 +6597,6 @@
   <p:clrMapOvr>
     <a:masterClrMapping/>
   </p:clrMapOvr>
-  <p:timing>
-    <p:tnLst>
-      <p:par>
-        <p:cTn id="1" dur="indefinite" restart="never" nodeType="tmRoot"/>
-      </p:par>
-    </p:tnLst>
-  </p:timing>
 </p:sld>
 </file>
 
@@ -6961,7 +6633,7 @@
           <a:lstStyle/>
           <a:p>
             <a:r>
-              <a:rPr lang="en-US" dirty="0" smtClean="0"/>
+              <a:rPr lang="en-US" dirty="0"/>
               <a:t>RFP and Proposal</a:t>
             </a:r>
             <a:endParaRPr lang="en-CA" dirty="0"/>
@@ -6984,7 +6656,7 @@
           <a:lstStyle/>
           <a:p>
             <a:r>
-              <a:rPr lang="en-US" dirty="0" smtClean="0"/>
+              <a:rPr lang="en-US" dirty="0"/>
               <a:t>Step 1: Getting the Project</a:t>
             </a:r>
             <a:endParaRPr lang="en-CA" dirty="0"/>
@@ -7043,10 +6715,10 @@
           <a:p>
             <a:pPr eaLnBrk="1" hangingPunct="1"/>
             <a:r>
-              <a:rPr lang="en-US" smtClean="0"/>
+              <a:rPr lang="en-US"/>
               <a:t>The Request For Proposal (RFP)</a:t>
             </a:r>
-            <a:endParaRPr lang="en-CA" smtClean="0"/>
+            <a:endParaRPr lang="en-CA"/>
           </a:p>
         </p:txBody>
       </p:sp>
@@ -7074,7 +6746,7 @@
               <a:defRPr/>
             </a:pPr>
             <a:r>
-              <a:rPr lang="en-US" dirty="0" smtClean="0"/>
+              <a:rPr lang="en-US" dirty="0"/>
               <a:t>Produced after current system is understood and requirements have been gathered</a:t>
             </a:r>
           </a:p>
@@ -7083,7 +6755,7 @@
               <a:defRPr/>
             </a:pPr>
             <a:r>
-              <a:rPr lang="en-US" dirty="0" smtClean="0"/>
+              <a:rPr lang="en-US" dirty="0"/>
               <a:t>Sent to vendors</a:t>
             </a:r>
           </a:p>
@@ -7092,7 +6764,7 @@
               <a:defRPr/>
             </a:pPr>
             <a:r>
-              <a:rPr lang="en-US" dirty="0" smtClean="0"/>
+              <a:rPr lang="en-US" dirty="0"/>
               <a:t>Describes situation, expectations, problem to be solved, details of what the vendor is expected to provide</a:t>
             </a:r>
           </a:p>
@@ -7101,7 +6773,7 @@
               <a:defRPr/>
             </a:pPr>
             <a:r>
-              <a:rPr lang="en-US" dirty="0" smtClean="0"/>
+              <a:rPr lang="en-US" dirty="0"/>
               <a:t>Sets guidelines for proposal structure</a:t>
             </a:r>
           </a:p>
@@ -7110,7 +6782,7 @@
               <a:defRPr/>
             </a:pPr>
             <a:r>
-              <a:rPr lang="en-US" dirty="0" smtClean="0"/>
+              <a:rPr lang="en-US" dirty="0"/>
               <a:t>Vendor prepares a proposal following guidelines in RFP</a:t>
             </a:r>
           </a:p>
@@ -7509,7 +7181,7 @@
           <a:p>
             <a:pPr eaLnBrk="1" hangingPunct="1"/>
             <a:r>
-              <a:rPr lang="en-US" sz="3600" smtClean="0"/>
+              <a:rPr lang="en-US" sz="3600"/>
               <a:t>The Request for Proposal</a:t>
             </a:r>
           </a:p>
@@ -7537,7 +7209,7 @@
           <a:p>
             <a:pPr marL="395288" lvl="1" indent="-398463" eaLnBrk="1" hangingPunct="1"/>
             <a:r>
-              <a:rPr lang="en-US" dirty="0" smtClean="0">
+              <a:rPr lang="en-US" dirty="0">
                 <a:hlinkClick r:id="rId2"/>
               </a:rPr>
               <a:t>http://en.wikipedia.org/wiki/Request_for_Proposal</a:t>
@@ -7546,42 +7218,34 @@
           </a:p>
           <a:p>
             <a:pPr marL="395288" lvl="1" indent="-398463" eaLnBrk="1" hangingPunct="1"/>
-            <a:endParaRPr lang="en-US" dirty="0" smtClean="0"/>
+            <a:endParaRPr lang="en-US" dirty="0"/>
           </a:p>
           <a:p>
             <a:pPr marL="395288" lvl="1" indent="-398463" eaLnBrk="1" hangingPunct="1"/>
             <a:r>
-              <a:rPr lang="en-US" dirty="0" smtClean="0"/>
-              <a:t>RFT </a:t>
-            </a:r>
-            <a:r>
               <a:rPr lang="en-US" dirty="0"/>
-              <a:t>s</a:t>
-            </a:r>
-            <a:r>
-              <a:rPr lang="en-US" dirty="0" smtClean="0"/>
-              <a:t>ample templates: </a:t>
+              <a:t>RFT sample templates: </a:t>
             </a:r>
           </a:p>
           <a:p>
             <a:pPr marL="795338" lvl="2" indent="-398463" eaLnBrk="1" hangingPunct="1"/>
             <a:r>
-              <a:rPr lang="en-US" dirty="0" smtClean="0">
+              <a:rPr lang="en-US" dirty="0">
                 <a:hlinkClick r:id="rId3"/>
               </a:rPr>
               <a:t>https://www.pandadoc.com/software-development-proposal-template</a:t>
             </a:r>
-            <a:endParaRPr lang="en-US" dirty="0" smtClean="0"/>
+            <a:endParaRPr lang="en-US" dirty="0"/>
           </a:p>
           <a:p>
             <a:pPr marL="795338" lvl="2" indent="-398463" eaLnBrk="1" hangingPunct="1"/>
             <a:r>
-              <a:rPr lang="en-US" dirty="0" smtClean="0">
+              <a:rPr lang="en-US" dirty="0">
                 <a:hlinkClick r:id="rId4"/>
               </a:rPr>
               <a:t>http://www.entrepreneur.com/formnet/form/1173</a:t>
             </a:r>
-            <a:endParaRPr lang="en-US" dirty="0" smtClean="0"/>
+            <a:endParaRPr lang="en-US" dirty="0"/>
           </a:p>
           <a:p>
             <a:pPr marL="396875" lvl="2" indent="0" eaLnBrk="1" hangingPunct="1">
@@ -7592,36 +7256,19 @@
           <a:p>
             <a:pPr marL="395288" lvl="1" indent="-398463" eaLnBrk="1" hangingPunct="1"/>
             <a:r>
-              <a:rPr lang="en-US" dirty="0" smtClean="0"/>
-              <a:t>Companies who specialize in custom software development may solicit </a:t>
-            </a:r>
-            <a:r>
               <a:rPr lang="en-US" dirty="0"/>
-              <a:t>RFP applications: </a:t>
-            </a:r>
-            <a:endParaRPr lang="en-US" dirty="0" smtClean="0"/>
+              <a:t>Companies who specialize in custom software development may solicit RFP applications: </a:t>
+            </a:r>
           </a:p>
           <a:p>
             <a:pPr marL="795338" lvl="2" indent="-398463" eaLnBrk="1" hangingPunct="1"/>
-            <a:r>
-              <a:rPr lang="en-US" dirty="0" smtClean="0">
-                <a:hlinkClick r:id="rId5"/>
-              </a:rPr>
-              <a:t>https</a:t>
-            </a:r>
             <a:r>
               <a:rPr lang="en-US" dirty="0">
                 <a:hlinkClick r:id="rId5"/>
               </a:rPr>
-              <a:t>://</a:t>
-            </a:r>
-            <a:r>
-              <a:rPr lang="en-US" dirty="0" smtClean="0">
-                <a:hlinkClick r:id="rId5"/>
-              </a:rPr>
-              <a:t>www.kandasoft.com/RFP-submission.html</a:t>
-            </a:r>
-            <a:endParaRPr lang="en-US" dirty="0" smtClean="0"/>
+              <a:t>https://www.kandasoft.com/RFP-submission.html</a:t>
+            </a:r>
+            <a:endParaRPr lang="en-US" dirty="0"/>
           </a:p>
           <a:p>
             <a:pPr marL="395288" lvl="1" indent="-398463" eaLnBrk="1" hangingPunct="1"/>
@@ -7629,11 +7276,7 @@
           </a:p>
           <a:p>
             <a:pPr marL="395288" lvl="1" indent="-398463" eaLnBrk="1" hangingPunct="1"/>
-            <a:endParaRPr lang="en-US" dirty="0" smtClean="0"/>
-          </a:p>
-          <a:p>
-            <a:pPr marL="395288" lvl="1" indent="-398463" eaLnBrk="1" hangingPunct="1"/>
-            <a:endParaRPr lang="en-US" dirty="0" smtClean="0"/>
+            <a:endParaRPr lang="en-US" dirty="0"/>
           </a:p>
           <a:p>
             <a:pPr marL="395288" lvl="1" indent="-398463" eaLnBrk="1" hangingPunct="1"/>
@@ -7641,7 +7284,11 @@
           </a:p>
           <a:p>
             <a:pPr marL="395288" lvl="1" indent="-398463" eaLnBrk="1" hangingPunct="1"/>
-            <a:endParaRPr lang="en-US" dirty="0" smtClean="0"/>
+            <a:endParaRPr lang="en-US" dirty="0"/>
+          </a:p>
+          <a:p>
+            <a:pPr marL="395288" lvl="1" indent="-398463" eaLnBrk="1" hangingPunct="1"/>
+            <a:endParaRPr lang="en-US" dirty="0"/>
           </a:p>
         </p:txBody>
       </p:sp>
@@ -7650,13 +7297,6 @@
   <p:clrMapOvr>
     <a:masterClrMapping/>
   </p:clrMapOvr>
-  <p:timing>
-    <p:tnLst>
-      <p:par>
-        <p:cTn id="1" dur="indefinite" restart="never" nodeType="tmRoot"/>
-      </p:par>
-    </p:tnLst>
-  </p:timing>
 </p:sld>
 </file>
 
@@ -7699,7 +7339,7 @@
           <a:p>
             <a:pPr eaLnBrk="1" hangingPunct="1"/>
             <a:r>
-              <a:rPr lang="en-US" sz="3600" smtClean="0"/>
+              <a:rPr lang="en-US" sz="3600"/>
               <a:t>The Proposal </a:t>
             </a:r>
           </a:p>
@@ -7727,66 +7367,66 @@
           <a:p>
             <a:pPr marL="571500" indent="-457200" eaLnBrk="1" hangingPunct="1"/>
             <a:r>
-              <a:rPr lang="en-US" dirty="0" smtClean="0"/>
+              <a:rPr lang="en-US" dirty="0"/>
               <a:t>Response to an RFP</a:t>
             </a:r>
           </a:p>
           <a:p>
             <a:pPr marL="571500" indent="-457200" eaLnBrk="1" hangingPunct="1"/>
             <a:r>
-              <a:rPr lang="en-US" dirty="0" smtClean="0"/>
+              <a:rPr lang="en-US" dirty="0"/>
               <a:t>Must follow the RFP guidelines for format</a:t>
             </a:r>
           </a:p>
           <a:p>
             <a:pPr marL="895350" lvl="1" indent="-381000" eaLnBrk="1" hangingPunct="1"/>
             <a:r>
-              <a:rPr lang="en-US" dirty="0" smtClean="0"/>
+              <a:rPr lang="en-US" dirty="0"/>
               <a:t>Makes evaluation of proposals easier if they are consistent in format</a:t>
             </a:r>
           </a:p>
           <a:p>
             <a:pPr marL="571500" indent="-457200" eaLnBrk="1" hangingPunct="1"/>
             <a:r>
-              <a:rPr lang="en-US" dirty="0" smtClean="0"/>
+              <a:rPr lang="en-US" dirty="0"/>
               <a:t>May be written as a speculative proposal without an RFP</a:t>
             </a:r>
           </a:p>
           <a:p>
             <a:pPr marL="571500" indent="-457200" eaLnBrk="1" hangingPunct="1"/>
             <a:r>
-              <a:rPr lang="en-US" dirty="0" smtClean="0"/>
-              <a:t>Internet search: “It project Proposal”</a:t>
+              <a:rPr lang="en-US" dirty="0"/>
+              <a:t>Internet search: “IT project Proposal”</a:t>
             </a:r>
           </a:p>
           <a:p>
             <a:pPr marL="971550" lvl="1" indent="-457200" eaLnBrk="1" hangingPunct="1"/>
             <a:r>
-              <a:rPr lang="en-US" dirty="0" smtClean="0"/>
+              <a:rPr lang="en-US" dirty="0"/>
               <a:t>Writing tips</a:t>
             </a:r>
           </a:p>
           <a:p>
             <a:pPr marL="971550" lvl="1" indent="-457200" eaLnBrk="1" hangingPunct="1"/>
             <a:r>
-              <a:rPr lang="en-US" dirty="0" smtClean="0"/>
+              <a:rPr lang="en-US" dirty="0"/>
               <a:t>Sample templates</a:t>
             </a:r>
           </a:p>
           <a:p>
             <a:pPr marL="971550" lvl="1" indent="-457200" eaLnBrk="1" hangingPunct="1"/>
             <a:r>
-              <a:rPr lang="en-US" dirty="0" smtClean="0"/>
+              <a:rPr lang="en-US" dirty="0"/>
               <a:t>… </a:t>
             </a:r>
             <a:r>
-              <a:rPr lang="en-US" i="1" dirty="0" smtClean="0"/>
+              <a:rPr lang="en-US" i="1" dirty="0"/>
               <a:t>take with a grain of salt, customize</a:t>
             </a:r>
             <a:br>
-              <a:rPr lang="en-US" i="1" dirty="0" smtClean="0"/>
+              <a:rPr lang="en-US" i="1" dirty="0"/>
             </a:br>
-            <a:endParaRPr lang="en-US" i="1" dirty="0" smtClean="0"/>
+            <a:endParaRPr lang="en-US" i="1" dirty="0"/>
           </a:p>
         </p:txBody>
       </p:sp>
@@ -8286,7 +7926,7 @@
           <a:p>
             <a:pPr eaLnBrk="1" hangingPunct="1"/>
             <a:r>
-              <a:rPr lang="en-US" sz="3600" smtClean="0"/>
+              <a:rPr lang="en-US" sz="3600"/>
               <a:t>The Proposal</a:t>
             </a:r>
           </a:p>
@@ -8314,76 +7954,76 @@
           <a:p>
             <a:pPr marL="571500" indent="-457200" eaLnBrk="1" hangingPunct="1"/>
             <a:r>
-              <a:rPr lang="en-US" dirty="0" smtClean="0"/>
+              <a:rPr lang="en-US" dirty="0"/>
               <a:t>Project Name, identification codes, date, etc.</a:t>
             </a:r>
           </a:p>
           <a:p>
             <a:pPr marL="571500" indent="-457200" eaLnBrk="1" hangingPunct="1"/>
             <a:r>
-              <a:rPr lang="en-US" dirty="0" smtClean="0"/>
+              <a:rPr lang="en-US" dirty="0"/>
               <a:t>Executive overview</a:t>
             </a:r>
           </a:p>
           <a:p>
             <a:pPr marL="571500" indent="-457200" eaLnBrk="1" hangingPunct="1"/>
             <a:r>
-              <a:rPr lang="en-US" dirty="0" smtClean="0"/>
+              <a:rPr lang="en-US" dirty="0"/>
               <a:t>Start &amp; finish dates</a:t>
             </a:r>
           </a:p>
           <a:p>
             <a:pPr marL="571500" indent="-457200" eaLnBrk="1" hangingPunct="1"/>
             <a:r>
-              <a:rPr lang="en-US" dirty="0" smtClean="0"/>
+              <a:rPr lang="en-US" dirty="0"/>
               <a:t>Goals/objectives</a:t>
             </a:r>
           </a:p>
           <a:p>
             <a:pPr marL="571500" indent="-457200" eaLnBrk="1" hangingPunct="1"/>
             <a:r>
-              <a:rPr lang="en-US" dirty="0" smtClean="0"/>
+              <a:rPr lang="en-US" dirty="0"/>
               <a:t>Scope</a:t>
             </a:r>
           </a:p>
           <a:p>
             <a:pPr marL="571500" indent="-457200" eaLnBrk="1" hangingPunct="1"/>
             <a:r>
-              <a:rPr lang="en-US" dirty="0" smtClean="0"/>
+              <a:rPr lang="en-US" dirty="0"/>
               <a:t>Cost estimates</a:t>
             </a:r>
           </a:p>
           <a:p>
             <a:pPr marL="571500" indent="-457200" eaLnBrk="1" hangingPunct="1"/>
             <a:r>
-              <a:rPr lang="en-US" dirty="0" smtClean="0"/>
+              <a:rPr lang="en-US" dirty="0"/>
               <a:t>Business justification (your sales pitch – why they should give the project to you)</a:t>
             </a:r>
           </a:p>
           <a:p>
             <a:pPr marL="571500" indent="-457200" eaLnBrk="1" hangingPunct="1"/>
             <a:r>
-              <a:rPr lang="en-US" dirty="0" smtClean="0"/>
+              <a:rPr lang="en-US" dirty="0"/>
               <a:t>Information about your company</a:t>
             </a:r>
           </a:p>
           <a:p>
             <a:pPr marL="571500" indent="-457200" eaLnBrk="1" hangingPunct="1"/>
             <a:r>
-              <a:rPr lang="en-US" dirty="0" smtClean="0"/>
+              <a:rPr lang="en-US" dirty="0"/>
               <a:t>Team members – biography, or </a:t>
             </a:r>
             <a:r>
-              <a:rPr lang="en-US" dirty="0" err="1" smtClean="0"/>
+              <a:rPr lang="en-US" dirty="0" err="1"/>
               <a:t>resum</a:t>
             </a:r>
             <a:r>
-              <a:rPr lang="en-US" dirty="0" err="1" smtClean="0">
+              <a:rPr lang="en-US" dirty="0" err="1">
                 <a:cs typeface="Tahoma" pitchFamily="34" charset="0"/>
               </a:rPr>
               <a:t>é</a:t>
             </a:r>
-            <a:endParaRPr lang="en-US" dirty="0" smtClean="0">
+            <a:endParaRPr lang="en-US" dirty="0">
               <a:cs typeface="Tahoma" pitchFamily="34" charset="0"/>
             </a:endParaRPr>
           </a:p>
@@ -8394,13 +8034,6 @@
   <p:clrMapOvr>
     <a:masterClrMapping/>
   </p:clrMapOvr>
-  <p:timing>
-    <p:tnLst>
-      <p:par>
-        <p:cTn id="1" dur="indefinite" restart="never" nodeType="tmRoot"/>
-      </p:par>
-    </p:tnLst>
-  </p:timing>
 </p:sld>
 </file>
 
@@ -8437,7 +8070,7 @@
           <a:lstStyle/>
           <a:p>
             <a:r>
-              <a:rPr lang="en-US" dirty="0" smtClean="0"/>
+              <a:rPr lang="en-US" dirty="0"/>
               <a:t>Project management Concepts</a:t>
             </a:r>
             <a:endParaRPr lang="en-CA" dirty="0"/>
@@ -8498,7 +8131,7 @@
               <a:defRPr/>
             </a:pPr>
             <a:r>
-              <a:rPr lang="en-US" sz="3600" dirty="0" smtClean="0">
+              <a:rPr lang="en-US" sz="3600" dirty="0">
                 <a:solidFill>
                   <a:schemeClr val="accent5">
                     <a:lumMod val="25000"/>
@@ -8507,7 +8140,7 @@
               </a:rPr>
               <a:t>Group Workshop</a:t>
             </a:r>
-            <a:endParaRPr lang="en-US" sz="3600" dirty="0" smtClean="0">
+            <a:endParaRPr lang="en-US" sz="3600" dirty="0">
               <a:solidFill>
                 <a:schemeClr val="accent2">
                   <a:lumMod val="75000"/>
@@ -8539,49 +8172,49 @@
           <a:p>
             <a:pPr marL="590550" indent="-533400" eaLnBrk="1" hangingPunct="1"/>
             <a:r>
-              <a:rPr lang="en-US" dirty="0" smtClean="0"/>
+              <a:rPr lang="en-US" dirty="0"/>
               <a:t>Working in your workshop groups, discuss the layout, topics, and business description you will use to create a presentation to the Travel Experts management.</a:t>
             </a:r>
           </a:p>
           <a:p>
             <a:pPr marL="590550" indent="-533400" eaLnBrk="1" hangingPunct="1"/>
             <a:r>
-              <a:rPr lang="en-US" dirty="0" smtClean="0"/>
+              <a:rPr lang="en-US" dirty="0"/>
               <a:t>The goal of the presentation is to:</a:t>
             </a:r>
           </a:p>
           <a:p>
             <a:pPr marL="990600" lvl="1" indent="-533400" eaLnBrk="1" hangingPunct="1"/>
             <a:r>
-              <a:rPr lang="en-US" dirty="0" smtClean="0"/>
+              <a:rPr lang="en-US" dirty="0"/>
               <a:t>Introduce your team</a:t>
             </a:r>
           </a:p>
           <a:p>
             <a:pPr marL="990600" lvl="1" indent="-533400" eaLnBrk="1" hangingPunct="1"/>
             <a:r>
-              <a:rPr lang="en-US" dirty="0" smtClean="0"/>
+              <a:rPr lang="en-US" dirty="0"/>
               <a:t>Propose your solution to their prototype development project</a:t>
             </a:r>
           </a:p>
           <a:p>
             <a:pPr marL="990600" lvl="1" indent="-533400" eaLnBrk="1" hangingPunct="1"/>
             <a:r>
-              <a:rPr lang="en-US" dirty="0" smtClean="0"/>
+              <a:rPr lang="en-US" dirty="0"/>
               <a:t>Demonstrate the website you have built to show them your capabilities</a:t>
             </a:r>
           </a:p>
           <a:p>
             <a:pPr marL="990600" lvl="1" indent="-533400" eaLnBrk="1" hangingPunct="1"/>
             <a:r>
-              <a:rPr lang="en-US" dirty="0" smtClean="0"/>
+              <a:rPr lang="en-US" dirty="0"/>
               <a:t>Provide an overview of the cost and schedule</a:t>
             </a:r>
           </a:p>
           <a:p>
             <a:pPr marL="590550" indent="-533400" eaLnBrk="1" hangingPunct="1"/>
             <a:r>
-              <a:rPr lang="en-US" dirty="0" smtClean="0"/>
+              <a:rPr lang="en-US" dirty="0"/>
               <a:t>Begin working on your presentation</a:t>
             </a:r>
           </a:p>
@@ -8592,13 +8225,6 @@
   <p:clrMapOvr>
     <a:masterClrMapping/>
   </p:clrMapOvr>
-  <p:timing>
-    <p:tnLst>
-      <p:par>
-        <p:cTn id="1" dur="indefinite" restart="never" nodeType="tmRoot"/>
-      </p:par>
-    </p:tnLst>
-  </p:timing>
 </p:sld>
 </file>
 
@@ -8641,7 +8267,7 @@
           <a:p>
             <a:pPr eaLnBrk="1" hangingPunct="1"/>
             <a:r>
-              <a:rPr lang="en-CA" dirty="0" smtClean="0"/>
+              <a:rPr lang="en-CA" dirty="0"/>
               <a:t>Good PM Books at SAIT Library</a:t>
             </a:r>
           </a:p>
@@ -8669,30 +8295,30 @@
           <a:p>
             <a:pPr eaLnBrk="1" hangingPunct="1"/>
             <a:r>
-              <a:rPr lang="en-US" dirty="0" smtClean="0"/>
+              <a:rPr lang="en-US" dirty="0"/>
               <a:t>“Absolute Beginner’s Guide to Project Management” by Greg </a:t>
             </a:r>
             <a:r>
-              <a:rPr lang="en-US" dirty="0" err="1" smtClean="0"/>
+              <a:rPr lang="en-US" dirty="0" err="1"/>
               <a:t>Horine</a:t>
             </a:r>
             <a:r>
-              <a:rPr lang="en-US" dirty="0" smtClean="0"/>
+              <a:rPr lang="en-US" dirty="0"/>
               <a:t>, 3</a:t>
             </a:r>
             <a:r>
-              <a:rPr lang="en-US" baseline="30000" dirty="0" smtClean="0"/>
+              <a:rPr lang="en-US" baseline="30000" dirty="0"/>
               <a:t>rd</a:t>
             </a:r>
             <a:r>
-              <a:rPr lang="en-US" dirty="0" smtClean="0"/>
+              <a:rPr lang="en-US" dirty="0"/>
               <a:t> Edition, 2013, QUE, ISBN: 978-0-7897-5010-5 </a:t>
             </a:r>
           </a:p>
           <a:p>
             <a:pPr eaLnBrk="1" hangingPunct="1"/>
             <a:r>
-              <a:rPr lang="en-US" dirty="0" smtClean="0"/>
+              <a:rPr lang="en-US" dirty="0"/>
               <a:t>“Information Technology Project management” by Kathy Schwalbe, 2014</a:t>
             </a:r>
           </a:p>
@@ -8720,13 +8346,8 @@
             </a:r>
             <a:r>
               <a:rPr lang="en-CA" dirty="0"/>
-              <a:t>, </a:t>
-            </a:r>
-            <a:r>
-              <a:rPr lang="en-CA" dirty="0" smtClean="0"/>
-              <a:t>2014 (e-book)</a:t>
-            </a:r>
-            <a:endParaRPr lang="en-CA" dirty="0"/>
+              <a:t>, 2014 (e-book)</a:t>
+            </a:r>
           </a:p>
           <a:p>
             <a:pPr eaLnBrk="1" hangingPunct="1"/>
@@ -8739,13 +8360,6 @@
   <p:clrMapOvr>
     <a:masterClrMapping/>
   </p:clrMapOvr>
-  <p:timing>
-    <p:tnLst>
-      <p:par>
-        <p:cTn id="1" dur="indefinite" restart="never" nodeType="tmRoot"/>
-      </p:par>
-    </p:tnLst>
-  </p:timing>
 </p:sld>
 </file>
 
@@ -8788,7 +8402,7 @@
           <a:p>
             <a:pPr eaLnBrk="1" hangingPunct="1"/>
             <a:r>
-              <a:rPr lang="en-CA" smtClean="0">
+              <a:rPr lang="en-CA">
                 <a:solidFill>
                   <a:schemeClr val="tx1"/>
                 </a:solidFill>
@@ -8796,7 +8410,7 @@
               <a:t>Project</a:t>
             </a:r>
             <a:r>
-              <a:rPr lang="en-CA" smtClean="0"/>
+              <a:rPr lang="en-CA"/>
               <a:t> Definition</a:t>
             </a:r>
           </a:p>
@@ -8824,11 +8438,11 @@
           <a:p>
             <a:pPr eaLnBrk="1" hangingPunct="1"/>
             <a:r>
-              <a:rPr lang="en-US" sz="2800" dirty="0" smtClean="0"/>
+              <a:rPr lang="en-US" sz="2800" dirty="0"/>
               <a:t>“</a:t>
             </a:r>
             <a:r>
-              <a:rPr lang="en-CA" sz="2800" dirty="0" smtClean="0">
+              <a:rPr lang="en-CA" sz="2800" dirty="0">
                 <a:solidFill>
                   <a:srgbClr val="C00000"/>
                 </a:solidFill>
@@ -8836,10 +8450,10 @@
               <a:t>Project</a:t>
             </a:r>
             <a:r>
-              <a:rPr lang="en-CA" sz="2800" dirty="0" smtClean="0"/>
+              <a:rPr lang="en-CA" sz="2800" dirty="0"/>
               <a:t> is a finite endeavour (having specific start and completion dates) undertaken to create a unique product or service which brings about beneficial change or added value”</a:t>
             </a:r>
-            <a:endParaRPr lang="en-US" sz="2800" dirty="0" smtClean="0">
+            <a:endParaRPr lang="en-US" sz="2800" dirty="0">
               <a:solidFill>
                 <a:srgbClr val="002060"/>
               </a:solidFill>
@@ -8848,11 +8462,11 @@
           <a:p>
             <a:pPr eaLnBrk="1" hangingPunct="1"/>
             <a:r>
-              <a:rPr lang="en-CA" sz="2800" dirty="0" smtClean="0"/>
+              <a:rPr lang="en-CA" sz="2800" dirty="0"/>
               <a:t>Contrast with </a:t>
             </a:r>
             <a:r>
-              <a:rPr lang="en-CA" sz="2800" dirty="0" smtClean="0">
+              <a:rPr lang="en-CA" sz="2800" dirty="0">
                 <a:solidFill>
                   <a:srgbClr val="C00000"/>
                 </a:solidFill>
@@ -8860,7 +8474,7 @@
               <a:t>Process</a:t>
             </a:r>
             <a:r>
-              <a:rPr lang="en-CA" sz="2800" dirty="0" smtClean="0"/>
+              <a:rPr lang="en-CA" sz="2800" dirty="0"/>
               <a:t>: “Permanent or semi-permanent functional work to repetitively produce the same product or service”</a:t>
             </a:r>
           </a:p>
@@ -8869,7 +8483,7 @@
               <a:buFont typeface="Monotype Sorts"/>
               <a:buNone/>
             </a:pPr>
-            <a:endParaRPr lang="en-CA" sz="2000" dirty="0" smtClean="0">
+            <a:endParaRPr lang="en-CA" sz="2000" dirty="0">
               <a:solidFill>
                 <a:srgbClr val="002060"/>
               </a:solidFill>
@@ -8881,7 +8495,7 @@
               <a:buNone/>
             </a:pPr>
             <a:r>
-              <a:rPr lang="en-CA" sz="2000" dirty="0" smtClean="0">
+              <a:rPr lang="en-CA" sz="2000" dirty="0">
                 <a:solidFill>
                   <a:srgbClr val="002060"/>
                 </a:solidFill>
@@ -8889,7 +8503,7 @@
               <a:t>	</a:t>
             </a:r>
             <a:r>
-              <a:rPr lang="en-CA" sz="2000" dirty="0" smtClean="0">
+              <a:rPr lang="en-CA" sz="2000" dirty="0">
                 <a:solidFill>
                   <a:srgbClr val="002060"/>
                 </a:solidFill>
@@ -8898,18 +8512,18 @@
               <a:t>http://en.wikipedia.org/wiki/Project_management</a:t>
             </a:r>
             <a:r>
-              <a:rPr lang="en-CA" sz="2000" dirty="0" smtClean="0">
+              <a:rPr lang="en-CA" sz="2000" dirty="0">
                 <a:solidFill>
                   <a:srgbClr val="002060"/>
                 </a:solidFill>
               </a:rPr>
               <a:t> </a:t>
             </a:r>
-            <a:endParaRPr lang="en-CA" sz="2000" dirty="0" smtClean="0"/>
+            <a:endParaRPr lang="en-CA" sz="2000" dirty="0"/>
           </a:p>
           <a:p>
             <a:pPr eaLnBrk="1" hangingPunct="1"/>
-            <a:endParaRPr lang="en-CA" dirty="0" smtClean="0"/>
+            <a:endParaRPr lang="en-CA" dirty="0"/>
           </a:p>
         </p:txBody>
       </p:sp>
@@ -8918,13 +8532,6 @@
   <p:clrMapOvr>
     <a:masterClrMapping/>
   </p:clrMapOvr>
-  <p:timing>
-    <p:tnLst>
-      <p:par>
-        <p:cTn id="1" dur="indefinite" restart="never" nodeType="tmRoot"/>
-      </p:par>
-    </p:tnLst>
-  </p:timing>
 </p:sld>
 </file>
 
@@ -8966,10 +8573,9 @@
           <a:lstStyle/>
           <a:p>
             <a:r>
-              <a:rPr lang="en-CA" dirty="0" smtClean="0"/>
+              <a:rPr lang="en-CA" dirty="0"/>
               <a:t>Projects vs. Processes - Similarities*</a:t>
             </a:r>
-            <a:endParaRPr lang="en-CA" dirty="0"/>
           </a:p>
         </p:txBody>
       </p:sp>
@@ -8994,42 +8600,42 @@
           <a:lstStyle/>
           <a:p>
             <a:r>
-              <a:rPr lang="en-CA" dirty="0" smtClean="0"/>
+              <a:rPr lang="en-CA" dirty="0"/>
               <a:t>Planned, executed and controlled</a:t>
             </a:r>
           </a:p>
           <a:p>
             <a:r>
-              <a:rPr lang="en-CA" dirty="0" smtClean="0"/>
+              <a:rPr lang="en-CA" dirty="0"/>
               <a:t>Performed by people</a:t>
             </a:r>
           </a:p>
           <a:p>
             <a:r>
-              <a:rPr lang="en-CA" dirty="0" smtClean="0"/>
+              <a:rPr lang="en-CA" dirty="0"/>
               <a:t>Resource constrained</a:t>
             </a:r>
           </a:p>
           <a:p>
             <a:pPr lvl="1"/>
-            <a:endParaRPr lang="en-CA" dirty="0" smtClean="0"/>
+            <a:endParaRPr lang="en-CA" dirty="0"/>
           </a:p>
           <a:p>
             <a:pPr lvl="1"/>
-            <a:endParaRPr lang="en-CA" dirty="0" smtClean="0"/>
+            <a:endParaRPr lang="en-CA" dirty="0"/>
           </a:p>
           <a:p>
             <a:pPr lvl="1">
               <a:buNone/>
             </a:pPr>
-            <a:endParaRPr lang="en-CA" dirty="0" smtClean="0"/>
+            <a:endParaRPr lang="en-CA" dirty="0"/>
           </a:p>
           <a:p>
             <a:pPr lvl="1">
               <a:buNone/>
             </a:pPr>
             <a:r>
-              <a:rPr lang="en-CA" i="1" dirty="0" smtClean="0">
+              <a:rPr lang="en-CA" i="1" dirty="0">
                 <a:solidFill>
                   <a:srgbClr val="003399"/>
                 </a:solidFill>
@@ -9037,7 +8643,7 @@
               <a:t>* G. </a:t>
             </a:r>
             <a:r>
-              <a:rPr lang="en-CA" i="1" dirty="0" err="1" smtClean="0">
+              <a:rPr lang="en-CA" i="1" dirty="0" err="1">
                 <a:solidFill>
                   <a:srgbClr val="003399"/>
                 </a:solidFill>
@@ -9045,18 +8651,13 @@
               <a:t>Horine</a:t>
             </a:r>
             <a:r>
-              <a:rPr lang="en-CA" i="1" dirty="0" smtClean="0">
+              <a:rPr lang="en-CA" i="1" dirty="0">
                 <a:solidFill>
                   <a:srgbClr val="003399"/>
                 </a:solidFill>
               </a:rPr>
               <a:t> – “Project Management: Absolute Beginner Guide”</a:t>
             </a:r>
-            <a:endParaRPr lang="en-CA" i="1" dirty="0">
-              <a:solidFill>
-                <a:srgbClr val="003399"/>
-              </a:solidFill>
-            </a:endParaRPr>
           </a:p>
         </p:txBody>
       </p:sp>
@@ -9065,13 +8666,6 @@
   <p:clrMapOvr>
     <a:masterClrMapping/>
   </p:clrMapOvr>
-  <p:timing>
-    <p:tnLst>
-      <p:par>
-        <p:cTn id="1" dur="indefinite" restart="never" nodeType="tmRoot"/>
-      </p:par>
-    </p:tnLst>
-  </p:timing>
 </p:sld>
 </file>
 
@@ -9113,10 +8707,9 @@
           <a:lstStyle/>
           <a:p>
             <a:r>
-              <a:rPr lang="en-CA" dirty="0" smtClean="0"/>
+              <a:rPr lang="en-CA" dirty="0"/>
               <a:t>Projects vs. Processes - Differences*</a:t>
             </a:r>
-            <a:endParaRPr lang="en-CA" dirty="0"/>
           </a:p>
         </p:txBody>
       </p:sp>
@@ -9174,10 +8767,9 @@
                     <a:lstStyle/>
                     <a:p>
                       <a:r>
-                        <a:rPr lang="en-CA" dirty="0" smtClean="0"/>
+                        <a:rPr lang="en-CA" dirty="0"/>
                         <a:t>Feature</a:t>
                       </a:r>
-                      <a:endParaRPr lang="en-CA" dirty="0"/>
                     </a:p>
                   </a:txBody>
                   <a:tcPr/>
@@ -9188,10 +8780,9 @@
                     <a:lstStyle/>
                     <a:p>
                       <a:r>
-                        <a:rPr lang="en-CA" dirty="0" smtClean="0"/>
+                        <a:rPr lang="en-CA" dirty="0"/>
                         <a:t>Projects</a:t>
                       </a:r>
-                      <a:endParaRPr lang="en-CA" dirty="0"/>
                     </a:p>
                   </a:txBody>
                   <a:tcPr/>
@@ -9202,10 +8793,9 @@
                     <a:lstStyle/>
                     <a:p>
                       <a:r>
-                        <a:rPr lang="en-CA" dirty="0" smtClean="0"/>
+                        <a:rPr lang="en-CA" dirty="0"/>
                         <a:t>Processes</a:t>
                       </a:r>
-                      <a:endParaRPr lang="en-CA" dirty="0"/>
                     </a:p>
                   </a:txBody>
                   <a:tcPr/>
@@ -9223,10 +8813,9 @@
                     <a:lstStyle/>
                     <a:p>
                       <a:r>
-                        <a:rPr lang="en-CA" dirty="0" smtClean="0"/>
+                        <a:rPr lang="en-CA" dirty="0"/>
                         <a:t>Purpose</a:t>
                       </a:r>
-                      <a:endParaRPr lang="en-CA" dirty="0"/>
                     </a:p>
                   </a:txBody>
                   <a:tcPr/>
@@ -9237,11 +8826,11 @@
                     <a:lstStyle/>
                     <a:p>
                       <a:r>
-                        <a:rPr lang="en-CA" dirty="0" smtClean="0"/>
+                        <a:rPr lang="en-CA" dirty="0"/>
                         <a:t>Attain objectives</a:t>
                       </a:r>
                       <a:r>
-                        <a:rPr lang="en-CA" baseline="0" dirty="0" smtClean="0"/>
+                        <a:rPr lang="en-CA" baseline="0" dirty="0"/>
                         <a:t> and terminate</a:t>
                       </a:r>
                       <a:endParaRPr lang="en-CA" dirty="0"/>
@@ -9255,10 +8844,9 @@
                     <a:lstStyle/>
                     <a:p>
                       <a:r>
-                        <a:rPr lang="en-CA" dirty="0" smtClean="0"/>
+                        <a:rPr lang="en-CA" dirty="0"/>
                         <a:t>Sustain organization</a:t>
                       </a:r>
-                      <a:endParaRPr lang="en-CA" dirty="0"/>
                     </a:p>
                   </a:txBody>
                   <a:tcPr/>
@@ -9276,10 +8864,9 @@
                     <a:lstStyle/>
                     <a:p>
                       <a:r>
-                        <a:rPr lang="en-CA" dirty="0" smtClean="0"/>
+                        <a:rPr lang="en-CA" dirty="0"/>
                         <a:t>Time</a:t>
                       </a:r>
-                      <a:endParaRPr lang="en-CA" dirty="0"/>
                     </a:p>
                   </a:txBody>
                   <a:tcPr/>
@@ -9290,10 +8877,9 @@
                     <a:lstStyle/>
                     <a:p>
                       <a:r>
-                        <a:rPr lang="en-CA" dirty="0" smtClean="0"/>
+                        <a:rPr lang="en-CA" dirty="0"/>
                         <a:t>Temporary; defined start and end</a:t>
                       </a:r>
-                      <a:endParaRPr lang="en-CA" dirty="0"/>
                     </a:p>
                   </a:txBody>
                   <a:tcPr/>
@@ -9304,10 +8890,9 @@
                     <a:lstStyle/>
                     <a:p>
                       <a:r>
-                        <a:rPr lang="en-CA" dirty="0" smtClean="0"/>
+                        <a:rPr lang="en-CA" dirty="0"/>
                         <a:t>Ongoing</a:t>
                       </a:r>
-                      <a:endParaRPr lang="en-CA" dirty="0"/>
                     </a:p>
                   </a:txBody>
                   <a:tcPr/>
@@ -9325,10 +8910,9 @@
                     <a:lstStyle/>
                     <a:p>
                       <a:r>
-                        <a:rPr lang="en-CA" dirty="0" smtClean="0"/>
+                        <a:rPr lang="en-CA" dirty="0"/>
                         <a:t>Outcome</a:t>
                       </a:r>
-                      <a:endParaRPr lang="en-CA" dirty="0"/>
                     </a:p>
                   </a:txBody>
                   <a:tcPr/>
@@ -9339,10 +8923,9 @@
                     <a:lstStyle/>
                     <a:p>
                       <a:r>
-                        <a:rPr lang="en-CA" dirty="0" smtClean="0"/>
+                        <a:rPr lang="en-CA" dirty="0"/>
                         <a:t>Unique product, service or result</a:t>
                       </a:r>
-                      <a:endParaRPr lang="en-CA" dirty="0"/>
                     </a:p>
                   </a:txBody>
                   <a:tcPr/>
@@ -9353,11 +8936,11 @@
                     <a:lstStyle/>
                     <a:p>
                       <a:r>
-                        <a:rPr lang="en-CA" dirty="0" smtClean="0"/>
+                        <a:rPr lang="en-CA" dirty="0"/>
                         <a:t>Multiple</a:t>
                       </a:r>
                       <a:r>
-                        <a:rPr lang="en-CA" baseline="0" dirty="0" smtClean="0"/>
+                        <a:rPr lang="en-CA" baseline="0" dirty="0"/>
                         <a:t> products, services or results</a:t>
                       </a:r>
                       <a:endParaRPr lang="en-CA" dirty="0"/>
@@ -9378,10 +8961,9 @@
                     <a:lstStyle/>
                     <a:p>
                       <a:r>
-                        <a:rPr lang="en-CA" dirty="0" smtClean="0"/>
+                        <a:rPr lang="en-CA" dirty="0"/>
                         <a:t>People</a:t>
                       </a:r>
-                      <a:endParaRPr lang="en-CA" dirty="0"/>
                     </a:p>
                   </a:txBody>
                   <a:tcPr/>
@@ -9392,11 +8974,11 @@
                     <a:lstStyle/>
                     <a:p>
                       <a:r>
-                        <a:rPr lang="en-CA" dirty="0" smtClean="0"/>
+                        <a:rPr lang="en-CA" dirty="0"/>
                         <a:t>Temporary teams; not aligned</a:t>
                       </a:r>
                       <a:r>
-                        <a:rPr lang="en-CA" baseline="0" dirty="0" smtClean="0"/>
+                        <a:rPr lang="en-CA" baseline="0" dirty="0"/>
                         <a:t> with organization’s structure</a:t>
                       </a:r>
                       <a:endParaRPr lang="en-CA" dirty="0"/>
@@ -9410,10 +8992,9 @@
                     <a:lstStyle/>
                     <a:p>
                       <a:r>
-                        <a:rPr lang="en-CA" dirty="0" smtClean="0"/>
+                        <a:rPr lang="en-CA" dirty="0"/>
                         <a:t>Functional teams aligned with organization’s structure</a:t>
                       </a:r>
-                      <a:endParaRPr lang="en-CA" dirty="0"/>
                     </a:p>
                   </a:txBody>
                   <a:tcPr/>
@@ -9431,10 +9012,9 @@
                     <a:lstStyle/>
                     <a:p>
                       <a:r>
-                        <a:rPr lang="en-CA" dirty="0" smtClean="0"/>
+                        <a:rPr lang="en-CA" dirty="0"/>
                         <a:t>Authority of Manager</a:t>
                       </a:r>
-                      <a:endParaRPr lang="en-CA" dirty="0"/>
                     </a:p>
                   </a:txBody>
                   <a:tcPr/>
@@ -9445,20 +9025,15 @@
                     <a:lstStyle/>
                     <a:p>
                       <a:r>
-                        <a:rPr lang="en-CA" dirty="0" smtClean="0"/>
-                        <a:t>Varies </a:t>
-                      </a:r>
-                      <a:r>
-                        <a:rPr lang="en-CA" dirty="0" smtClean="0"/>
-                        <a:t>by organization</a:t>
+                        <a:rPr lang="en-CA" dirty="0"/>
+                        <a:t>Varies by organization</a:t>
                       </a:r>
                     </a:p>
                     <a:p>
                       <a:r>
-                        <a:rPr lang="en-CA" dirty="0" smtClean="0"/>
+                        <a:rPr lang="en-CA" dirty="0"/>
                         <a:t>Minimal line of authority</a:t>
                       </a:r>
-                      <a:endParaRPr lang="en-CA" dirty="0"/>
                     </a:p>
                   </a:txBody>
                   <a:tcPr/>
@@ -9469,10 +9044,9 @@
                     <a:lstStyle/>
                     <a:p>
                       <a:r>
-                        <a:rPr lang="en-CA" dirty="0" smtClean="0"/>
+                        <a:rPr lang="en-CA" dirty="0"/>
                         <a:t>Generally formal; direct line of authority</a:t>
                       </a:r>
-                      <a:endParaRPr lang="en-CA" dirty="0"/>
                     </a:p>
                   </a:txBody>
                   <a:tcPr/>
@@ -9511,7 +9085,7 @@
               <a:buNone/>
             </a:pPr>
             <a:r>
-              <a:rPr lang="en-CA" sz="1800" i="1" dirty="0" smtClean="0">
+              <a:rPr lang="en-CA" sz="1800" i="1" dirty="0">
                 <a:solidFill>
                   <a:srgbClr val="003399"/>
                 </a:solidFill>
@@ -9519,7 +9093,7 @@
               <a:t>* G. </a:t>
             </a:r>
             <a:r>
-              <a:rPr lang="en-CA" sz="1800" i="1" dirty="0" err="1" smtClean="0">
+              <a:rPr lang="en-CA" sz="1800" i="1" dirty="0" err="1">
                 <a:solidFill>
                   <a:srgbClr val="003399"/>
                 </a:solidFill>
@@ -9527,7 +9101,7 @@
               <a:t>Horine</a:t>
             </a:r>
             <a:r>
-              <a:rPr lang="en-CA" sz="1800" i="1" dirty="0" smtClean="0">
+              <a:rPr lang="en-CA" sz="1800" i="1" dirty="0">
                 <a:solidFill>
                   <a:srgbClr val="003399"/>
                 </a:solidFill>
@@ -9542,13 +9116,6 @@
   <p:clrMapOvr>
     <a:masterClrMapping/>
   </p:clrMapOvr>
-  <p:timing>
-    <p:tnLst>
-      <p:par>
-        <p:cTn id="1" dur="indefinite" restart="never" nodeType="tmRoot"/>
-      </p:par>
-    </p:tnLst>
-  </p:timing>
 </p:sld>
 </file>
 
@@ -9591,10 +9158,10 @@
           <a:p>
             <a:pPr eaLnBrk="1" hangingPunct="1"/>
             <a:r>
-              <a:rPr lang="en-GB" dirty="0" smtClean="0"/>
+              <a:rPr lang="en-GB" dirty="0"/>
               <a:t>Project Characteristics</a:t>
             </a:r>
-            <a:endParaRPr lang="en-US" dirty="0" smtClean="0"/>
+            <a:endParaRPr lang="en-US" dirty="0"/>
           </a:p>
         </p:txBody>
       </p:sp>
@@ -10116,7 +9683,7 @@
           <a:p>
             <a:pPr eaLnBrk="1" hangingPunct="1"/>
             <a:r>
-              <a:rPr lang="en-CA" smtClean="0"/>
+              <a:rPr lang="en-CA"/>
               <a:t>Project Goals &amp; Objectives</a:t>
             </a:r>
           </a:p>
@@ -10144,90 +9711,90 @@
           <a:p>
             <a:pPr eaLnBrk="1" hangingPunct="1"/>
             <a:r>
-              <a:rPr lang="en-CA" dirty="0" smtClean="0"/>
+              <a:rPr lang="en-CA" dirty="0"/>
               <a:t>Goal</a:t>
             </a:r>
           </a:p>
           <a:p>
             <a:pPr lvl="1" eaLnBrk="1" hangingPunct="1"/>
             <a:r>
-              <a:rPr lang="en-CA" dirty="0" smtClean="0"/>
+              <a:rPr lang="en-CA" dirty="0"/>
               <a:t>End result – what are we trying to accomplish</a:t>
             </a:r>
           </a:p>
           <a:p>
             <a:pPr eaLnBrk="1" hangingPunct="1"/>
             <a:r>
-              <a:rPr lang="en-CA" dirty="0" smtClean="0"/>
+              <a:rPr lang="en-CA" dirty="0"/>
               <a:t>Objectives</a:t>
             </a:r>
           </a:p>
           <a:p>
             <a:pPr lvl="1" eaLnBrk="1" hangingPunct="1"/>
             <a:r>
-              <a:rPr lang="en-CA" dirty="0" smtClean="0"/>
+              <a:rPr lang="en-CA" dirty="0"/>
               <a:t>Steps -- how are we going to reach the goal</a:t>
             </a:r>
           </a:p>
           <a:p>
             <a:pPr lvl="1" eaLnBrk="1" hangingPunct="1"/>
             <a:r>
-              <a:rPr lang="en-CA" b="1" dirty="0" smtClean="0"/>
+              <a:rPr lang="en-CA" b="1" dirty="0"/>
               <a:t>S</a:t>
             </a:r>
             <a:r>
-              <a:rPr lang="en-CA" dirty="0" smtClean="0"/>
+              <a:rPr lang="en-CA" dirty="0"/>
               <a:t> = Specific</a:t>
             </a:r>
           </a:p>
           <a:p>
             <a:pPr lvl="1" eaLnBrk="1" hangingPunct="1"/>
             <a:r>
-              <a:rPr lang="en-CA" b="1" dirty="0" smtClean="0"/>
+              <a:rPr lang="en-CA" b="1" dirty="0"/>
               <a:t>M</a:t>
             </a:r>
             <a:r>
-              <a:rPr lang="en-CA" dirty="0" smtClean="0"/>
+              <a:rPr lang="en-CA" dirty="0"/>
               <a:t> = Measurable</a:t>
             </a:r>
           </a:p>
           <a:p>
             <a:pPr lvl="1" eaLnBrk="1" hangingPunct="1"/>
             <a:r>
-              <a:rPr lang="en-CA" b="1" dirty="0" smtClean="0"/>
+              <a:rPr lang="en-CA" b="1" dirty="0"/>
               <a:t>A</a:t>
             </a:r>
             <a:r>
-              <a:rPr lang="en-CA" dirty="0" smtClean="0"/>
+              <a:rPr lang="en-CA" dirty="0"/>
               <a:t> = Achievable (or Agreed-To)</a:t>
             </a:r>
           </a:p>
           <a:p>
             <a:pPr lvl="1" eaLnBrk="1" hangingPunct="1"/>
             <a:r>
-              <a:rPr lang="en-CA" b="1" dirty="0" smtClean="0"/>
+              <a:rPr lang="en-CA" b="1" dirty="0"/>
               <a:t>R</a:t>
             </a:r>
             <a:r>
-              <a:rPr lang="en-CA" dirty="0" smtClean="0"/>
+              <a:rPr lang="en-CA" dirty="0"/>
               <a:t> = Relevant (or: Realistic, Rewarding)</a:t>
             </a:r>
           </a:p>
           <a:p>
             <a:pPr lvl="1" eaLnBrk="1" hangingPunct="1"/>
             <a:r>
-              <a:rPr lang="en-CA" b="1" dirty="0" smtClean="0"/>
+              <a:rPr lang="en-CA" b="1" dirty="0"/>
               <a:t>T</a:t>
             </a:r>
             <a:r>
-              <a:rPr lang="en-CA" dirty="0" smtClean="0"/>
+              <a:rPr lang="en-CA" dirty="0"/>
               <a:t> = Time-bound</a:t>
             </a:r>
           </a:p>
           <a:p>
             <a:pPr eaLnBrk="1" hangingPunct="1"/>
             <a:r>
-              <a:rPr lang="en-CA" dirty="0" smtClean="0"/>
+              <a:rPr lang="en-CA" dirty="0"/>
               <a:t>Maybe the acronym should be SMAARRRT?</a:t>
             </a:r>
           </a:p>
@@ -10238,13 +9805,6 @@
   <p:clrMapOvr>
     <a:masterClrMapping/>
   </p:clrMapOvr>
-  <p:timing>
-    <p:tnLst>
-      <p:par>
-        <p:cTn id="1" dur="indefinite" restart="never" nodeType="tmRoot"/>
-      </p:par>
-    </p:tnLst>
-  </p:timing>
 </p:sld>
 </file>
 

</xml_diff>